<commit_message>
Design Doc v1.2 updated
Updated as per the discussions on 11-12 Nov at Delhi
</commit_message>
<xml_diff>
--- a/Grevol-VCU.pptx
+++ b/Grevol-VCU.pptx
@@ -277,7 +277,7 @@
           <a:p>
             <a:fld id="{B6EFB734-C584-46AC-AF3F-E173215E49FA}" type="datetimeFigureOut">
               <a:rPr lang="en-IN" smtClean="0"/>
-              <a:t>09-11-2025</a:t>
+              <a:t>11-11-2025</a:t>
             </a:fld>
             <a:endParaRPr lang="en-IN"/>
           </a:p>
@@ -477,7 +477,7 @@
           <a:p>
             <a:fld id="{B6EFB734-C584-46AC-AF3F-E173215E49FA}" type="datetimeFigureOut">
               <a:rPr lang="en-IN" smtClean="0"/>
-              <a:t>09-11-2025</a:t>
+              <a:t>11-11-2025</a:t>
             </a:fld>
             <a:endParaRPr lang="en-IN"/>
           </a:p>
@@ -687,7 +687,7 @@
           <a:p>
             <a:fld id="{B6EFB734-C584-46AC-AF3F-E173215E49FA}" type="datetimeFigureOut">
               <a:rPr lang="en-IN" smtClean="0"/>
-              <a:t>09-11-2025</a:t>
+              <a:t>11-11-2025</a:t>
             </a:fld>
             <a:endParaRPr lang="en-IN"/>
           </a:p>
@@ -887,7 +887,7 @@
           <a:p>
             <a:fld id="{B6EFB734-C584-46AC-AF3F-E173215E49FA}" type="datetimeFigureOut">
               <a:rPr lang="en-IN" smtClean="0"/>
-              <a:t>09-11-2025</a:t>
+              <a:t>11-11-2025</a:t>
             </a:fld>
             <a:endParaRPr lang="en-IN"/>
           </a:p>
@@ -1163,7 +1163,7 @@
           <a:p>
             <a:fld id="{B6EFB734-C584-46AC-AF3F-E173215E49FA}" type="datetimeFigureOut">
               <a:rPr lang="en-IN" smtClean="0"/>
-              <a:t>09-11-2025</a:t>
+              <a:t>11-11-2025</a:t>
             </a:fld>
             <a:endParaRPr lang="en-IN"/>
           </a:p>
@@ -1431,7 +1431,7 @@
           <a:p>
             <a:fld id="{B6EFB734-C584-46AC-AF3F-E173215E49FA}" type="datetimeFigureOut">
               <a:rPr lang="en-IN" smtClean="0"/>
-              <a:t>09-11-2025</a:t>
+              <a:t>11-11-2025</a:t>
             </a:fld>
             <a:endParaRPr lang="en-IN"/>
           </a:p>
@@ -1846,7 +1846,7 @@
           <a:p>
             <a:fld id="{B6EFB734-C584-46AC-AF3F-E173215E49FA}" type="datetimeFigureOut">
               <a:rPr lang="en-IN" smtClean="0"/>
-              <a:t>09-11-2025</a:t>
+              <a:t>11-11-2025</a:t>
             </a:fld>
             <a:endParaRPr lang="en-IN"/>
           </a:p>
@@ -1988,7 +1988,7 @@
           <a:p>
             <a:fld id="{B6EFB734-C584-46AC-AF3F-E173215E49FA}" type="datetimeFigureOut">
               <a:rPr lang="en-IN" smtClean="0"/>
-              <a:t>09-11-2025</a:t>
+              <a:t>11-11-2025</a:t>
             </a:fld>
             <a:endParaRPr lang="en-IN"/>
           </a:p>
@@ -2101,7 +2101,7 @@
           <a:p>
             <a:fld id="{B6EFB734-C584-46AC-AF3F-E173215E49FA}" type="datetimeFigureOut">
               <a:rPr lang="en-IN" smtClean="0"/>
-              <a:t>09-11-2025</a:t>
+              <a:t>11-11-2025</a:t>
             </a:fld>
             <a:endParaRPr lang="en-IN"/>
           </a:p>
@@ -2414,7 +2414,7 @@
           <a:p>
             <a:fld id="{B6EFB734-C584-46AC-AF3F-E173215E49FA}" type="datetimeFigureOut">
               <a:rPr lang="en-IN" smtClean="0"/>
-              <a:t>09-11-2025</a:t>
+              <a:t>11-11-2025</a:t>
             </a:fld>
             <a:endParaRPr lang="en-IN"/>
           </a:p>
@@ -2703,7 +2703,7 @@
           <a:p>
             <a:fld id="{B6EFB734-C584-46AC-AF3F-E173215E49FA}" type="datetimeFigureOut">
               <a:rPr lang="en-IN" smtClean="0"/>
-              <a:t>09-11-2025</a:t>
+              <a:t>11-11-2025</a:t>
             </a:fld>
             <a:endParaRPr lang="en-IN"/>
           </a:p>
@@ -2946,7 +2946,7 @@
           <a:p>
             <a:fld id="{B6EFB734-C584-46AC-AF3F-E173215E49FA}" type="datetimeFigureOut">
               <a:rPr lang="en-IN" smtClean="0"/>
-              <a:t>09-11-2025</a:t>
+              <a:t>11-11-2025</a:t>
             </a:fld>
             <a:endParaRPr lang="en-IN"/>
           </a:p>
@@ -6242,1253 +6242,1364 @@
           </a:p>
         </p:txBody>
       </p:sp>
-      <p:sp>
-        <p:nvSpPr>
-          <p:cNvPr id="5" name="Rectangle 4">
+      <p:grpSp>
+        <p:nvGrpSpPr>
+          <p:cNvPr id="25" name="Group 24">
             <a:extLst>
               <a:ext uri="{FF2B5EF4-FFF2-40B4-BE49-F238E27FC236}">
-                <a16:creationId xmlns:a16="http://schemas.microsoft.com/office/drawing/2014/main" id="{17DE978B-2FF6-6FAB-5969-A87E79AF76FF}"/>
+                <a16:creationId xmlns:a16="http://schemas.microsoft.com/office/drawing/2014/main" id="{A34CE9CB-A617-5550-3824-0922A5E91583}"/>
               </a:ext>
             </a:extLst>
           </p:cNvPr>
-          <p:cNvSpPr/>
+          <p:cNvGrpSpPr/>
           <p:nvPr/>
-        </p:nvSpPr>
-        <p:spPr>
+        </p:nvGrpSpPr>
+        <p:grpSpPr>
           <a:xfrm>
-            <a:off x="3820931" y="4486185"/>
-            <a:ext cx="1079291" cy="1663908"/>
+            <a:off x="682057" y="534059"/>
+            <a:ext cx="11091778" cy="6056798"/>
+            <a:chOff x="682057" y="534059"/>
+            <a:chExt cx="11091778" cy="6056798"/>
           </a:xfrm>
-          <a:prstGeom prst="rect">
-            <a:avLst/>
-          </a:prstGeom>
-        </p:spPr>
-        <p:style>
-          <a:lnRef idx="2">
-            <a:schemeClr val="accent1">
-              <a:shade val="15000"/>
-            </a:schemeClr>
-          </a:lnRef>
-          <a:fillRef idx="1">
-            <a:schemeClr val="accent1"/>
-          </a:fillRef>
-          <a:effectRef idx="0">
-            <a:schemeClr val="accent1"/>
-          </a:effectRef>
-          <a:fontRef idx="minor">
-            <a:schemeClr val="lt1"/>
-          </a:fontRef>
-        </p:style>
-        <p:txBody>
-          <a:bodyPr rtlCol="0" anchor="ctr"/>
-          <a:lstStyle/>
-          <a:p>
-            <a:pPr algn="ctr"/>
-            <a:r>
-              <a:rPr lang="en-IN" dirty="0"/>
-              <a:t>Driver DB</a:t>
-            </a:r>
-          </a:p>
-        </p:txBody>
-      </p:sp>
-      <p:sp>
-        <p:nvSpPr>
-          <p:cNvPr id="6" name="Rectangle 5">
-            <a:extLst>
-              <a:ext uri="{FF2B5EF4-FFF2-40B4-BE49-F238E27FC236}">
-                <a16:creationId xmlns:a16="http://schemas.microsoft.com/office/drawing/2014/main" id="{140FE7E0-31BC-1EBD-3007-BEC227D8D23B}"/>
-              </a:ext>
-            </a:extLst>
-          </p:cNvPr>
-          <p:cNvSpPr/>
-          <p:nvPr/>
-        </p:nvSpPr>
-        <p:spPr>
-          <a:xfrm>
-            <a:off x="3834362" y="758533"/>
-            <a:ext cx="1079291" cy="1663908"/>
-          </a:xfrm>
-          <a:prstGeom prst="rect">
-            <a:avLst/>
-          </a:prstGeom>
-        </p:spPr>
-        <p:style>
-          <a:lnRef idx="2">
-            <a:schemeClr val="accent1">
-              <a:shade val="15000"/>
-            </a:schemeClr>
-          </a:lnRef>
-          <a:fillRef idx="1">
-            <a:schemeClr val="accent1"/>
-          </a:fillRef>
-          <a:effectRef idx="0">
-            <a:schemeClr val="accent1"/>
-          </a:effectRef>
-          <a:fontRef idx="minor">
-            <a:schemeClr val="lt1"/>
-          </a:fontRef>
-        </p:style>
-        <p:txBody>
-          <a:bodyPr rtlCol="0" anchor="ctr"/>
-          <a:lstStyle/>
-          <a:p>
-            <a:pPr algn="ctr"/>
-            <a:r>
-              <a:rPr lang="en-IN" dirty="0"/>
-              <a:t>VCU DB</a:t>
-            </a:r>
-          </a:p>
-        </p:txBody>
-      </p:sp>
-      <p:sp>
-        <p:nvSpPr>
-          <p:cNvPr id="7" name="Rectangle 6">
-            <a:extLst>
-              <a:ext uri="{FF2B5EF4-FFF2-40B4-BE49-F238E27FC236}">
-                <a16:creationId xmlns:a16="http://schemas.microsoft.com/office/drawing/2014/main" id="{2AD84284-143E-F664-0A08-90A43A5D6823}"/>
-              </a:ext>
-            </a:extLst>
-          </p:cNvPr>
-          <p:cNvSpPr/>
-          <p:nvPr/>
-        </p:nvSpPr>
-        <p:spPr>
-          <a:xfrm>
-            <a:off x="3820931" y="2546110"/>
-            <a:ext cx="1079291" cy="1663908"/>
-          </a:xfrm>
-          <a:prstGeom prst="rect">
-            <a:avLst/>
-          </a:prstGeom>
-        </p:spPr>
-        <p:style>
-          <a:lnRef idx="2">
-            <a:schemeClr val="accent1">
-              <a:shade val="15000"/>
-            </a:schemeClr>
-          </a:lnRef>
-          <a:fillRef idx="1">
-            <a:schemeClr val="accent1"/>
-          </a:fillRef>
-          <a:effectRef idx="0">
-            <a:schemeClr val="accent1"/>
-          </a:effectRef>
-          <a:fontRef idx="minor">
-            <a:schemeClr val="lt1"/>
-          </a:fontRef>
-        </p:style>
-        <p:txBody>
-          <a:bodyPr rtlCol="0" anchor="ctr"/>
-          <a:lstStyle/>
-          <a:p>
-            <a:pPr algn="ctr"/>
-            <a:r>
-              <a:rPr lang="en-IN" dirty="0"/>
-              <a:t>BMS DB</a:t>
-            </a:r>
-          </a:p>
-        </p:txBody>
-      </p:sp>
-      <p:sp>
-        <p:nvSpPr>
-          <p:cNvPr id="8" name="Oval 7">
-            <a:extLst>
-              <a:ext uri="{FF2B5EF4-FFF2-40B4-BE49-F238E27FC236}">
-                <a16:creationId xmlns:a16="http://schemas.microsoft.com/office/drawing/2014/main" id="{49B835A3-A9CE-5FE7-E1E8-C7A7005059E4}"/>
-              </a:ext>
-            </a:extLst>
-          </p:cNvPr>
-          <p:cNvSpPr/>
-          <p:nvPr/>
-        </p:nvSpPr>
-        <p:spPr>
-          <a:xfrm>
-            <a:off x="682057" y="1717033"/>
-            <a:ext cx="2203554" cy="764499"/>
-          </a:xfrm>
-          <a:prstGeom prst="ellipse">
-            <a:avLst/>
-          </a:prstGeom>
-        </p:spPr>
-        <p:style>
-          <a:lnRef idx="2">
-            <a:schemeClr val="accent1">
-              <a:shade val="15000"/>
-            </a:schemeClr>
-          </a:lnRef>
-          <a:fillRef idx="1">
-            <a:schemeClr val="accent1"/>
-          </a:fillRef>
-          <a:effectRef idx="0">
-            <a:schemeClr val="accent1"/>
-          </a:effectRef>
-          <a:fontRef idx="minor">
-            <a:schemeClr val="lt1"/>
-          </a:fontRef>
-        </p:style>
-        <p:txBody>
-          <a:bodyPr rtlCol="0" anchor="ctr"/>
-          <a:lstStyle/>
-          <a:p>
-            <a:pPr algn="ctr"/>
-            <a:r>
-              <a:rPr lang="en-US" dirty="0"/>
-              <a:t>CAN Comm Process</a:t>
-            </a:r>
-            <a:endParaRPr lang="en-IN" dirty="0"/>
-          </a:p>
-        </p:txBody>
-      </p:sp>
-      <p:sp>
-        <p:nvSpPr>
-          <p:cNvPr id="9" name="Oval 8">
-            <a:extLst>
-              <a:ext uri="{FF2B5EF4-FFF2-40B4-BE49-F238E27FC236}">
-                <a16:creationId xmlns:a16="http://schemas.microsoft.com/office/drawing/2014/main" id="{12EA51DD-BA04-74BA-D1DD-21EA3A7455B8}"/>
-              </a:ext>
-            </a:extLst>
-          </p:cNvPr>
-          <p:cNvSpPr/>
-          <p:nvPr/>
-        </p:nvSpPr>
-        <p:spPr>
-          <a:xfrm>
-            <a:off x="682057" y="2866231"/>
-            <a:ext cx="2203554" cy="764499"/>
-          </a:xfrm>
-          <a:prstGeom prst="ellipse">
-            <a:avLst/>
-          </a:prstGeom>
-        </p:spPr>
-        <p:style>
-          <a:lnRef idx="2">
-            <a:schemeClr val="accent1">
-              <a:shade val="15000"/>
-            </a:schemeClr>
-          </a:lnRef>
-          <a:fillRef idx="1">
-            <a:schemeClr val="accent1"/>
-          </a:fillRef>
-          <a:effectRef idx="0">
-            <a:schemeClr val="accent1"/>
-          </a:effectRef>
-          <a:fontRef idx="minor">
-            <a:schemeClr val="lt1"/>
-          </a:fontRef>
-        </p:style>
-        <p:txBody>
-          <a:bodyPr rtlCol="0" anchor="ctr"/>
-          <a:lstStyle/>
-          <a:p>
-            <a:pPr algn="ctr"/>
-            <a:r>
-              <a:rPr lang="en-US" dirty="0"/>
-              <a:t>UART Comm Process</a:t>
-            </a:r>
-            <a:endParaRPr lang="en-IN" dirty="0"/>
-          </a:p>
-        </p:txBody>
-      </p:sp>
-      <p:sp>
-        <p:nvSpPr>
-          <p:cNvPr id="10" name="Oval 9">
-            <a:extLst>
-              <a:ext uri="{FF2B5EF4-FFF2-40B4-BE49-F238E27FC236}">
-                <a16:creationId xmlns:a16="http://schemas.microsoft.com/office/drawing/2014/main" id="{97C9424B-08DD-033E-05C4-4769FB0065CB}"/>
-              </a:ext>
-            </a:extLst>
-          </p:cNvPr>
-          <p:cNvSpPr/>
-          <p:nvPr/>
-        </p:nvSpPr>
-        <p:spPr>
-          <a:xfrm>
-            <a:off x="9570281" y="1462635"/>
-            <a:ext cx="2203554" cy="764499"/>
-          </a:xfrm>
-          <a:prstGeom prst="ellipse">
-            <a:avLst/>
-          </a:prstGeom>
-        </p:spPr>
-        <p:style>
-          <a:lnRef idx="2">
-            <a:schemeClr val="accent1">
-              <a:shade val="15000"/>
-            </a:schemeClr>
-          </a:lnRef>
-          <a:fillRef idx="1">
-            <a:schemeClr val="accent1"/>
-          </a:fillRef>
-          <a:effectRef idx="0">
-            <a:schemeClr val="accent1"/>
-          </a:effectRef>
-          <a:fontRef idx="minor">
-            <a:schemeClr val="lt1"/>
-          </a:fontRef>
-        </p:style>
-        <p:txBody>
-          <a:bodyPr rtlCol="0" anchor="ctr"/>
-          <a:lstStyle/>
-          <a:p>
-            <a:pPr algn="ctr"/>
-            <a:r>
-              <a:rPr lang="en-US" dirty="0"/>
-              <a:t>SPI Comm Process</a:t>
-            </a:r>
-            <a:endParaRPr lang="en-IN" dirty="0"/>
-          </a:p>
-        </p:txBody>
-      </p:sp>
-      <p:sp>
-        <p:nvSpPr>
-          <p:cNvPr id="11" name="Rectangle 10">
-            <a:extLst>
-              <a:ext uri="{FF2B5EF4-FFF2-40B4-BE49-F238E27FC236}">
-                <a16:creationId xmlns:a16="http://schemas.microsoft.com/office/drawing/2014/main" id="{7AFAE1D3-370F-D644-A195-42E917662D1C}"/>
-              </a:ext>
-            </a:extLst>
-          </p:cNvPr>
-          <p:cNvSpPr/>
-          <p:nvPr/>
-        </p:nvSpPr>
-        <p:spPr>
-          <a:xfrm>
-            <a:off x="10132412" y="2706185"/>
-            <a:ext cx="1079291" cy="1663908"/>
-          </a:xfrm>
-          <a:prstGeom prst="rect">
-            <a:avLst/>
-          </a:prstGeom>
-        </p:spPr>
-        <p:style>
-          <a:lnRef idx="2">
-            <a:schemeClr val="accent1">
-              <a:shade val="15000"/>
-            </a:schemeClr>
-          </a:lnRef>
-          <a:fillRef idx="1">
-            <a:schemeClr val="accent1"/>
-          </a:fillRef>
-          <a:effectRef idx="0">
-            <a:schemeClr val="accent1"/>
-          </a:effectRef>
-          <a:fontRef idx="minor">
-            <a:schemeClr val="lt1"/>
-          </a:fontRef>
-        </p:style>
-        <p:txBody>
-          <a:bodyPr rtlCol="0" anchor="ctr"/>
-          <a:lstStyle/>
-          <a:p>
-            <a:pPr algn="ctr"/>
-            <a:r>
-              <a:rPr lang="en-IN" dirty="0" err="1"/>
-              <a:t>SFlash</a:t>
-            </a:r>
-            <a:endParaRPr lang="en-IN" dirty="0"/>
-          </a:p>
-        </p:txBody>
-      </p:sp>
-      <p:sp>
-        <p:nvSpPr>
-          <p:cNvPr id="12" name="Oval 11">
-            <a:extLst>
-              <a:ext uri="{FF2B5EF4-FFF2-40B4-BE49-F238E27FC236}">
-                <a16:creationId xmlns:a16="http://schemas.microsoft.com/office/drawing/2014/main" id="{F93F0EAE-BB67-99CE-3735-669CF15F89D0}"/>
-              </a:ext>
-            </a:extLst>
-          </p:cNvPr>
-          <p:cNvSpPr/>
-          <p:nvPr/>
-        </p:nvSpPr>
-        <p:spPr>
-          <a:xfrm>
-            <a:off x="5908937" y="2613565"/>
-            <a:ext cx="2203554" cy="764499"/>
-          </a:xfrm>
-          <a:prstGeom prst="ellipse">
-            <a:avLst/>
-          </a:prstGeom>
-        </p:spPr>
-        <p:style>
-          <a:lnRef idx="2">
-            <a:schemeClr val="accent1">
-              <a:shade val="15000"/>
-            </a:schemeClr>
-          </a:lnRef>
-          <a:fillRef idx="1">
-            <a:schemeClr val="accent1"/>
-          </a:fillRef>
-          <a:effectRef idx="0">
-            <a:schemeClr val="accent1"/>
-          </a:effectRef>
-          <a:fontRef idx="minor">
-            <a:schemeClr val="lt1"/>
-          </a:fontRef>
-        </p:style>
-        <p:txBody>
-          <a:bodyPr rtlCol="0" anchor="ctr"/>
-          <a:lstStyle/>
-          <a:p>
-            <a:pPr algn="ctr"/>
-            <a:r>
-              <a:rPr lang="en-US" dirty="0"/>
-              <a:t>VCU Process</a:t>
-            </a:r>
-            <a:endParaRPr lang="en-IN" dirty="0"/>
-          </a:p>
-        </p:txBody>
-      </p:sp>
-      <p:sp>
-        <p:nvSpPr>
-          <p:cNvPr id="13" name="Oval 12">
-            <a:extLst>
-              <a:ext uri="{FF2B5EF4-FFF2-40B4-BE49-F238E27FC236}">
-                <a16:creationId xmlns:a16="http://schemas.microsoft.com/office/drawing/2014/main" id="{F03EE054-80C2-E45B-F6F8-DF5A2F03E50C}"/>
-              </a:ext>
-            </a:extLst>
-          </p:cNvPr>
-          <p:cNvSpPr/>
-          <p:nvPr/>
-        </p:nvSpPr>
-        <p:spPr>
-          <a:xfrm>
-            <a:off x="6024485" y="5194174"/>
-            <a:ext cx="2203554" cy="764499"/>
-          </a:xfrm>
-          <a:prstGeom prst="ellipse">
-            <a:avLst/>
-          </a:prstGeom>
-        </p:spPr>
-        <p:style>
-          <a:lnRef idx="2">
-            <a:schemeClr val="accent1">
-              <a:shade val="15000"/>
-            </a:schemeClr>
-          </a:lnRef>
-          <a:fillRef idx="1">
-            <a:schemeClr val="accent1"/>
-          </a:fillRef>
-          <a:effectRef idx="0">
-            <a:schemeClr val="accent1"/>
-          </a:effectRef>
-          <a:fontRef idx="minor">
-            <a:schemeClr val="lt1"/>
-          </a:fontRef>
-        </p:style>
-        <p:txBody>
-          <a:bodyPr rtlCol="0" anchor="ctr"/>
-          <a:lstStyle/>
-          <a:p>
-            <a:pPr algn="ctr"/>
-            <a:r>
-              <a:rPr lang="en-US" dirty="0"/>
-              <a:t>BMS Process</a:t>
-            </a:r>
-            <a:endParaRPr lang="en-IN" dirty="0"/>
-          </a:p>
-        </p:txBody>
-      </p:sp>
-      <p:sp>
-        <p:nvSpPr>
-          <p:cNvPr id="14" name="Oval 13">
-            <a:extLst>
-              <a:ext uri="{FF2B5EF4-FFF2-40B4-BE49-F238E27FC236}">
-                <a16:creationId xmlns:a16="http://schemas.microsoft.com/office/drawing/2014/main" id="{3ED63028-9EF1-0365-7FF3-20A5928C6B90}"/>
-              </a:ext>
-            </a:extLst>
-          </p:cNvPr>
-          <p:cNvSpPr/>
-          <p:nvPr/>
-        </p:nvSpPr>
-        <p:spPr>
-          <a:xfrm>
-            <a:off x="682057" y="3915112"/>
-            <a:ext cx="2203554" cy="764499"/>
-          </a:xfrm>
-          <a:prstGeom prst="ellipse">
-            <a:avLst/>
-          </a:prstGeom>
-        </p:spPr>
-        <p:style>
-          <a:lnRef idx="2">
-            <a:schemeClr val="accent1">
-              <a:shade val="15000"/>
-            </a:schemeClr>
-          </a:lnRef>
-          <a:fillRef idx="1">
-            <a:schemeClr val="accent1"/>
-          </a:fillRef>
-          <a:effectRef idx="0">
-            <a:schemeClr val="accent1"/>
-          </a:effectRef>
-          <a:fontRef idx="minor">
-            <a:schemeClr val="lt1"/>
-          </a:fontRef>
-        </p:style>
-        <p:txBody>
-          <a:bodyPr rtlCol="0" anchor="ctr"/>
-          <a:lstStyle/>
-          <a:p>
-            <a:pPr algn="ctr"/>
-            <a:r>
-              <a:rPr lang="en-US" dirty="0"/>
-              <a:t>Analog Process</a:t>
-            </a:r>
-            <a:endParaRPr lang="en-IN" dirty="0"/>
-          </a:p>
-        </p:txBody>
-      </p:sp>
-      <p:sp>
-        <p:nvSpPr>
-          <p:cNvPr id="15" name="Oval 14">
-            <a:extLst>
-              <a:ext uri="{FF2B5EF4-FFF2-40B4-BE49-F238E27FC236}">
-                <a16:creationId xmlns:a16="http://schemas.microsoft.com/office/drawing/2014/main" id="{BB04F515-193D-A9A8-D097-0444C8F1BE29}"/>
-              </a:ext>
-            </a:extLst>
-          </p:cNvPr>
-          <p:cNvSpPr/>
-          <p:nvPr/>
-        </p:nvSpPr>
-        <p:spPr>
-          <a:xfrm>
-            <a:off x="682057" y="4870735"/>
-            <a:ext cx="2203554" cy="764499"/>
-          </a:xfrm>
-          <a:prstGeom prst="ellipse">
-            <a:avLst/>
-          </a:prstGeom>
-        </p:spPr>
-        <p:style>
-          <a:lnRef idx="2">
-            <a:schemeClr val="accent1">
-              <a:shade val="15000"/>
-            </a:schemeClr>
-          </a:lnRef>
-          <a:fillRef idx="1">
-            <a:schemeClr val="accent1"/>
-          </a:fillRef>
-          <a:effectRef idx="0">
-            <a:schemeClr val="accent1"/>
-          </a:effectRef>
-          <a:fontRef idx="minor">
-            <a:schemeClr val="lt1"/>
-          </a:fontRef>
-        </p:style>
-        <p:txBody>
-          <a:bodyPr rtlCol="0" anchor="ctr"/>
-          <a:lstStyle/>
-          <a:p>
-            <a:pPr algn="ctr"/>
-            <a:r>
-              <a:rPr lang="en-US" dirty="0"/>
-              <a:t>GPIO Process</a:t>
-            </a:r>
-            <a:endParaRPr lang="en-IN" dirty="0"/>
-          </a:p>
-        </p:txBody>
-      </p:sp>
-      <p:sp>
-        <p:nvSpPr>
-          <p:cNvPr id="16" name="Oval 15">
-            <a:extLst>
-              <a:ext uri="{FF2B5EF4-FFF2-40B4-BE49-F238E27FC236}">
-                <a16:creationId xmlns:a16="http://schemas.microsoft.com/office/drawing/2014/main" id="{B33FA15C-3317-D850-22CC-A9D1BC7F9889}"/>
-              </a:ext>
-            </a:extLst>
-          </p:cNvPr>
-          <p:cNvSpPr/>
-          <p:nvPr/>
-        </p:nvSpPr>
-        <p:spPr>
-          <a:xfrm>
-            <a:off x="682057" y="5826358"/>
-            <a:ext cx="2203554" cy="764499"/>
-          </a:xfrm>
-          <a:prstGeom prst="ellipse">
-            <a:avLst/>
-          </a:prstGeom>
-        </p:spPr>
-        <p:style>
-          <a:lnRef idx="2">
-            <a:schemeClr val="accent1">
-              <a:shade val="15000"/>
-            </a:schemeClr>
-          </a:lnRef>
-          <a:fillRef idx="1">
-            <a:schemeClr val="accent1"/>
-          </a:fillRef>
-          <a:effectRef idx="0">
-            <a:schemeClr val="accent1"/>
-          </a:effectRef>
-          <a:fontRef idx="minor">
-            <a:schemeClr val="lt1"/>
-          </a:fontRef>
-        </p:style>
-        <p:txBody>
-          <a:bodyPr rtlCol="0" anchor="ctr"/>
-          <a:lstStyle/>
-          <a:p>
-            <a:pPr algn="ctr"/>
-            <a:r>
-              <a:rPr lang="en-US" dirty="0"/>
-              <a:t>PWM &amp; </a:t>
-            </a:r>
-            <a:r>
-              <a:rPr lang="en-US" dirty="0" err="1"/>
-              <a:t>FrqIn</a:t>
-            </a:r>
-            <a:r>
-              <a:rPr lang="en-US" dirty="0"/>
-              <a:t> Process</a:t>
-            </a:r>
-            <a:endParaRPr lang="en-IN" dirty="0"/>
-          </a:p>
-        </p:txBody>
-      </p:sp>
-      <p:cxnSp>
-        <p:nvCxnSpPr>
-          <p:cNvPr id="17" name="Connector: Elbow 25">
-            <a:extLst>
-              <a:ext uri="{FF2B5EF4-FFF2-40B4-BE49-F238E27FC236}">
-                <a16:creationId xmlns:a16="http://schemas.microsoft.com/office/drawing/2014/main" id="{5EE0F36F-6F6C-5953-885B-626F2869C56D}"/>
-              </a:ext>
-            </a:extLst>
-          </p:cNvPr>
-          <p:cNvCxnSpPr>
-            <a:cxnSpLocks/>
-            <a:stCxn id="8" idx="6"/>
-            <a:endCxn id="6" idx="1"/>
-          </p:cNvCxnSpPr>
-          <p:nvPr/>
-        </p:nvCxnSpPr>
-        <p:spPr>
-          <a:xfrm flipV="1">
-            <a:off x="2885611" y="1590487"/>
-            <a:ext cx="948751" cy="508796"/>
-          </a:xfrm>
-          <a:prstGeom prst="curvedConnector3">
-            <a:avLst>
-              <a:gd name="adj1" fmla="val 50000"/>
-            </a:avLst>
-          </a:prstGeom>
-          <a:ln>
-            <a:headEnd type="triangle"/>
-            <a:tailEnd type="triangle"/>
-          </a:ln>
-        </p:spPr>
-        <p:style>
-          <a:lnRef idx="2">
-            <a:schemeClr val="accent1"/>
-          </a:lnRef>
-          <a:fillRef idx="0">
-            <a:schemeClr val="accent1"/>
-          </a:fillRef>
-          <a:effectRef idx="1">
-            <a:schemeClr val="accent1"/>
-          </a:effectRef>
-          <a:fontRef idx="minor">
-            <a:schemeClr val="tx1"/>
-          </a:fontRef>
-        </p:style>
-      </p:cxnSp>
-      <p:cxnSp>
-        <p:nvCxnSpPr>
-          <p:cNvPr id="21" name="Connector: Elbow 25">
-            <a:extLst>
-              <a:ext uri="{FF2B5EF4-FFF2-40B4-BE49-F238E27FC236}">
-                <a16:creationId xmlns:a16="http://schemas.microsoft.com/office/drawing/2014/main" id="{C0A8C820-E182-90E7-C4C4-131036468F12}"/>
-              </a:ext>
-            </a:extLst>
-          </p:cNvPr>
-          <p:cNvCxnSpPr>
-            <a:cxnSpLocks/>
-            <a:stCxn id="9" idx="6"/>
-            <a:endCxn id="7" idx="1"/>
-          </p:cNvCxnSpPr>
-          <p:nvPr/>
-        </p:nvCxnSpPr>
-        <p:spPr>
-          <a:xfrm>
-            <a:off x="2885611" y="3248481"/>
-            <a:ext cx="935320" cy="129583"/>
-          </a:xfrm>
-          <a:prstGeom prst="curvedConnector3">
-            <a:avLst>
-              <a:gd name="adj1" fmla="val 50000"/>
-            </a:avLst>
-          </a:prstGeom>
-          <a:ln>
-            <a:headEnd type="triangle"/>
-            <a:tailEnd type="triangle"/>
-          </a:ln>
-        </p:spPr>
-        <p:style>
-          <a:lnRef idx="2">
-            <a:schemeClr val="accent1"/>
-          </a:lnRef>
-          <a:fillRef idx="0">
-            <a:schemeClr val="accent1"/>
-          </a:fillRef>
-          <a:effectRef idx="1">
-            <a:schemeClr val="accent1"/>
-          </a:effectRef>
-          <a:fontRef idx="minor">
-            <a:schemeClr val="tx1"/>
-          </a:fontRef>
-        </p:style>
-      </p:cxnSp>
-      <p:cxnSp>
-        <p:nvCxnSpPr>
-          <p:cNvPr id="29" name="Connector: Elbow 25">
-            <a:extLst>
-              <a:ext uri="{FF2B5EF4-FFF2-40B4-BE49-F238E27FC236}">
-                <a16:creationId xmlns:a16="http://schemas.microsoft.com/office/drawing/2014/main" id="{88F53EF5-ABDA-D854-0B87-A01827AD5E0A}"/>
-              </a:ext>
-            </a:extLst>
-          </p:cNvPr>
-          <p:cNvCxnSpPr>
-            <a:cxnSpLocks/>
-            <a:stCxn id="8" idx="6"/>
-            <a:endCxn id="7" idx="1"/>
-          </p:cNvCxnSpPr>
-          <p:nvPr/>
-        </p:nvCxnSpPr>
-        <p:spPr>
-          <a:xfrm>
-            <a:off x="2885611" y="2099283"/>
-            <a:ext cx="935320" cy="1278781"/>
-          </a:xfrm>
-          <a:prstGeom prst="curvedConnector3">
-            <a:avLst>
-              <a:gd name="adj1" fmla="val 50000"/>
-            </a:avLst>
-          </a:prstGeom>
-          <a:ln>
-            <a:headEnd type="triangle"/>
-            <a:tailEnd type="triangle"/>
-          </a:ln>
-        </p:spPr>
-        <p:style>
-          <a:lnRef idx="2">
-            <a:schemeClr val="accent1"/>
-          </a:lnRef>
-          <a:fillRef idx="0">
-            <a:schemeClr val="accent1"/>
-          </a:fillRef>
-          <a:effectRef idx="1">
-            <a:schemeClr val="accent1"/>
-          </a:effectRef>
-          <a:fontRef idx="minor">
-            <a:schemeClr val="tx1"/>
-          </a:fontRef>
-        </p:style>
-      </p:cxnSp>
-      <p:cxnSp>
-        <p:nvCxnSpPr>
-          <p:cNvPr id="32" name="Connector: Elbow 25">
-            <a:extLst>
-              <a:ext uri="{FF2B5EF4-FFF2-40B4-BE49-F238E27FC236}">
-                <a16:creationId xmlns:a16="http://schemas.microsoft.com/office/drawing/2014/main" id="{339C47A0-076D-42C7-16B7-D1E755213C22}"/>
-              </a:ext>
-            </a:extLst>
-          </p:cNvPr>
-          <p:cNvCxnSpPr>
-            <a:cxnSpLocks/>
-            <a:stCxn id="14" idx="6"/>
-            <a:endCxn id="5" idx="1"/>
-          </p:cNvCxnSpPr>
-          <p:nvPr/>
-        </p:nvCxnSpPr>
-        <p:spPr>
-          <a:xfrm>
-            <a:off x="2885611" y="4297362"/>
-            <a:ext cx="935320" cy="1020777"/>
-          </a:xfrm>
-          <a:prstGeom prst="curvedConnector3">
-            <a:avLst>
-              <a:gd name="adj1" fmla="val 50000"/>
-            </a:avLst>
-          </a:prstGeom>
-          <a:ln>
-            <a:headEnd type="triangle"/>
-            <a:tailEnd type="triangle"/>
-          </a:ln>
-        </p:spPr>
-        <p:style>
-          <a:lnRef idx="2">
-            <a:schemeClr val="accent1"/>
-          </a:lnRef>
-          <a:fillRef idx="0">
-            <a:schemeClr val="accent1"/>
-          </a:fillRef>
-          <a:effectRef idx="1">
-            <a:schemeClr val="accent1"/>
-          </a:effectRef>
-          <a:fontRef idx="minor">
-            <a:schemeClr val="tx1"/>
-          </a:fontRef>
-        </p:style>
-      </p:cxnSp>
-      <p:cxnSp>
-        <p:nvCxnSpPr>
-          <p:cNvPr id="35" name="Connector: Elbow 25">
-            <a:extLst>
-              <a:ext uri="{FF2B5EF4-FFF2-40B4-BE49-F238E27FC236}">
-                <a16:creationId xmlns:a16="http://schemas.microsoft.com/office/drawing/2014/main" id="{D8D5F878-1BC6-CC98-39FD-896A32034898}"/>
-              </a:ext>
-            </a:extLst>
-          </p:cNvPr>
-          <p:cNvCxnSpPr>
-            <a:cxnSpLocks/>
-            <a:stCxn id="16" idx="6"/>
-            <a:endCxn id="5" idx="1"/>
-          </p:cNvCxnSpPr>
-          <p:nvPr/>
-        </p:nvCxnSpPr>
-        <p:spPr>
-          <a:xfrm flipV="1">
-            <a:off x="2885611" y="5318139"/>
-            <a:ext cx="935320" cy="890469"/>
-          </a:xfrm>
-          <a:prstGeom prst="curvedConnector3">
-            <a:avLst>
-              <a:gd name="adj1" fmla="val 50000"/>
-            </a:avLst>
-          </a:prstGeom>
-          <a:ln>
-            <a:headEnd type="triangle"/>
-            <a:tailEnd type="triangle"/>
-          </a:ln>
-        </p:spPr>
-        <p:style>
-          <a:lnRef idx="2">
-            <a:schemeClr val="accent1"/>
-          </a:lnRef>
-          <a:fillRef idx="0">
-            <a:schemeClr val="accent1"/>
-          </a:fillRef>
-          <a:effectRef idx="1">
-            <a:schemeClr val="accent1"/>
-          </a:effectRef>
-          <a:fontRef idx="minor">
-            <a:schemeClr val="tx1"/>
-          </a:fontRef>
-        </p:style>
-      </p:cxnSp>
-      <p:cxnSp>
-        <p:nvCxnSpPr>
-          <p:cNvPr id="38" name="Connector: Elbow 25">
-            <a:extLst>
-              <a:ext uri="{FF2B5EF4-FFF2-40B4-BE49-F238E27FC236}">
-                <a16:creationId xmlns:a16="http://schemas.microsoft.com/office/drawing/2014/main" id="{0C7A13AC-B458-290D-E2B6-0523CE651504}"/>
-              </a:ext>
-            </a:extLst>
-          </p:cNvPr>
-          <p:cNvCxnSpPr>
-            <a:cxnSpLocks/>
-            <a:stCxn id="15" idx="6"/>
-            <a:endCxn id="5" idx="1"/>
-          </p:cNvCxnSpPr>
-          <p:nvPr/>
-        </p:nvCxnSpPr>
-        <p:spPr>
-          <a:xfrm>
-            <a:off x="2885611" y="5252985"/>
-            <a:ext cx="935320" cy="65154"/>
-          </a:xfrm>
-          <a:prstGeom prst="curvedConnector3">
-            <a:avLst>
-              <a:gd name="adj1" fmla="val 50000"/>
-            </a:avLst>
-          </a:prstGeom>
-          <a:ln>
-            <a:headEnd type="triangle"/>
-            <a:tailEnd type="triangle"/>
-          </a:ln>
-        </p:spPr>
-        <p:style>
-          <a:lnRef idx="2">
-            <a:schemeClr val="accent1"/>
-          </a:lnRef>
-          <a:fillRef idx="0">
-            <a:schemeClr val="accent1"/>
-          </a:fillRef>
-          <a:effectRef idx="1">
-            <a:schemeClr val="accent1"/>
-          </a:effectRef>
-          <a:fontRef idx="minor">
-            <a:schemeClr val="tx1"/>
-          </a:fontRef>
-        </p:style>
-      </p:cxnSp>
-      <p:cxnSp>
-        <p:nvCxnSpPr>
-          <p:cNvPr id="42" name="Connector: Elbow 25">
-            <a:extLst>
-              <a:ext uri="{FF2B5EF4-FFF2-40B4-BE49-F238E27FC236}">
-                <a16:creationId xmlns:a16="http://schemas.microsoft.com/office/drawing/2014/main" id="{0A7979BF-C1F3-C8BA-7381-037F85F7A513}"/>
-              </a:ext>
-            </a:extLst>
-          </p:cNvPr>
-          <p:cNvCxnSpPr>
-            <a:cxnSpLocks/>
-            <a:stCxn id="6" idx="3"/>
-            <a:endCxn id="12" idx="0"/>
-          </p:cNvCxnSpPr>
-          <p:nvPr/>
-        </p:nvCxnSpPr>
-        <p:spPr>
-          <a:xfrm>
-            <a:off x="4913653" y="1590487"/>
-            <a:ext cx="2097061" cy="1023078"/>
-          </a:xfrm>
-          <a:prstGeom prst="curvedConnector2">
-            <a:avLst/>
-          </a:prstGeom>
-          <a:ln>
-            <a:headEnd type="triangle"/>
-            <a:tailEnd type="triangle"/>
-          </a:ln>
-        </p:spPr>
-        <p:style>
-          <a:lnRef idx="2">
-            <a:schemeClr val="accent1"/>
-          </a:lnRef>
-          <a:fillRef idx="0">
-            <a:schemeClr val="accent1"/>
-          </a:fillRef>
-          <a:effectRef idx="1">
-            <a:schemeClr val="accent1"/>
-          </a:effectRef>
-          <a:fontRef idx="minor">
-            <a:schemeClr val="tx1"/>
-          </a:fontRef>
-        </p:style>
-      </p:cxnSp>
-      <p:cxnSp>
-        <p:nvCxnSpPr>
-          <p:cNvPr id="45" name="Connector: Elbow 25">
-            <a:extLst>
-              <a:ext uri="{FF2B5EF4-FFF2-40B4-BE49-F238E27FC236}">
-                <a16:creationId xmlns:a16="http://schemas.microsoft.com/office/drawing/2014/main" id="{A0989D92-D547-440A-AFD0-4D4644126D3E}"/>
-              </a:ext>
-            </a:extLst>
-          </p:cNvPr>
-          <p:cNvCxnSpPr>
-            <a:cxnSpLocks/>
-            <a:stCxn id="5" idx="3"/>
-            <a:endCxn id="12" idx="4"/>
-          </p:cNvCxnSpPr>
-          <p:nvPr/>
-        </p:nvCxnSpPr>
-        <p:spPr>
-          <a:xfrm flipV="1">
-            <a:off x="4900222" y="3378064"/>
-            <a:ext cx="2110492" cy="1940075"/>
-          </a:xfrm>
-          <a:prstGeom prst="curvedConnector2">
-            <a:avLst/>
-          </a:prstGeom>
-          <a:ln>
-            <a:headEnd type="triangle"/>
-            <a:tailEnd type="triangle"/>
-          </a:ln>
-        </p:spPr>
-        <p:style>
-          <a:lnRef idx="2">
-            <a:schemeClr val="accent1"/>
-          </a:lnRef>
-          <a:fillRef idx="0">
-            <a:schemeClr val="accent1"/>
-          </a:fillRef>
-          <a:effectRef idx="1">
-            <a:schemeClr val="accent1"/>
-          </a:effectRef>
-          <a:fontRef idx="minor">
-            <a:schemeClr val="tx1"/>
-          </a:fontRef>
-        </p:style>
-      </p:cxnSp>
-      <p:cxnSp>
-        <p:nvCxnSpPr>
-          <p:cNvPr id="48" name="Connector: Elbow 25">
-            <a:extLst>
-              <a:ext uri="{FF2B5EF4-FFF2-40B4-BE49-F238E27FC236}">
-                <a16:creationId xmlns:a16="http://schemas.microsoft.com/office/drawing/2014/main" id="{FAA39A3A-7270-4FEE-5EE0-77ACAA0897DF}"/>
-              </a:ext>
-            </a:extLst>
-          </p:cNvPr>
-          <p:cNvCxnSpPr>
-            <a:cxnSpLocks/>
-            <a:stCxn id="7" idx="3"/>
-            <a:endCxn id="13" idx="0"/>
-          </p:cNvCxnSpPr>
-          <p:nvPr/>
-        </p:nvCxnSpPr>
-        <p:spPr>
-          <a:xfrm>
-            <a:off x="4900222" y="3378064"/>
-            <a:ext cx="2226040" cy="1816110"/>
-          </a:xfrm>
-          <a:prstGeom prst="curvedConnector2">
-            <a:avLst/>
-          </a:prstGeom>
-          <a:ln>
-            <a:headEnd type="triangle"/>
-            <a:tailEnd type="triangle"/>
-          </a:ln>
-        </p:spPr>
-        <p:style>
-          <a:lnRef idx="2">
-            <a:schemeClr val="accent1"/>
-          </a:lnRef>
-          <a:fillRef idx="0">
-            <a:schemeClr val="accent1"/>
-          </a:fillRef>
-          <a:effectRef idx="1">
-            <a:schemeClr val="accent1"/>
-          </a:effectRef>
-          <a:fontRef idx="minor">
-            <a:schemeClr val="tx1"/>
-          </a:fontRef>
-        </p:style>
-      </p:cxnSp>
-      <p:cxnSp>
-        <p:nvCxnSpPr>
-          <p:cNvPr id="51" name="Connector: Elbow 25">
-            <a:extLst>
-              <a:ext uri="{FF2B5EF4-FFF2-40B4-BE49-F238E27FC236}">
-                <a16:creationId xmlns:a16="http://schemas.microsoft.com/office/drawing/2014/main" id="{862D9A01-2E05-27D7-8A81-FAE3D8579BDA}"/>
-              </a:ext>
-            </a:extLst>
-          </p:cNvPr>
-          <p:cNvCxnSpPr>
-            <a:cxnSpLocks/>
-            <a:stCxn id="10" idx="4"/>
-            <a:endCxn id="11" idx="0"/>
-          </p:cNvCxnSpPr>
-          <p:nvPr/>
-        </p:nvCxnSpPr>
-        <p:spPr>
-          <a:xfrm rot="5400000">
-            <a:off x="10432533" y="2466659"/>
-            <a:ext cx="479051" cy="12700"/>
-          </a:xfrm>
-          <a:prstGeom prst="curvedConnector3">
-            <a:avLst>
-              <a:gd name="adj1" fmla="val 50000"/>
-            </a:avLst>
-          </a:prstGeom>
-          <a:ln>
-            <a:headEnd type="triangle"/>
-            <a:tailEnd type="triangle"/>
-          </a:ln>
-        </p:spPr>
-        <p:style>
-          <a:lnRef idx="2">
-            <a:schemeClr val="accent1"/>
-          </a:lnRef>
-          <a:fillRef idx="0">
-            <a:schemeClr val="accent1"/>
-          </a:fillRef>
-          <a:effectRef idx="1">
-            <a:schemeClr val="accent1"/>
-          </a:effectRef>
-          <a:fontRef idx="minor">
-            <a:schemeClr val="tx1"/>
-          </a:fontRef>
-        </p:style>
-      </p:cxnSp>
-      <p:sp>
-        <p:nvSpPr>
-          <p:cNvPr id="59" name="Oval 58">
-            <a:extLst>
-              <a:ext uri="{FF2B5EF4-FFF2-40B4-BE49-F238E27FC236}">
-                <a16:creationId xmlns:a16="http://schemas.microsoft.com/office/drawing/2014/main" id="{579B0C72-1BD8-3699-6515-DFC4773C4034}"/>
-              </a:ext>
-            </a:extLst>
-          </p:cNvPr>
-          <p:cNvSpPr/>
-          <p:nvPr/>
-        </p:nvSpPr>
-        <p:spPr>
-          <a:xfrm>
-            <a:off x="5908937" y="534059"/>
-            <a:ext cx="2203554" cy="764499"/>
-          </a:xfrm>
-          <a:prstGeom prst="ellipse">
-            <a:avLst/>
-          </a:prstGeom>
-        </p:spPr>
-        <p:style>
-          <a:lnRef idx="2">
-            <a:schemeClr val="accent1">
-              <a:shade val="15000"/>
-            </a:schemeClr>
-          </a:lnRef>
-          <a:fillRef idx="1">
-            <a:schemeClr val="accent1"/>
-          </a:fillRef>
-          <a:effectRef idx="0">
-            <a:schemeClr val="accent1"/>
-          </a:effectRef>
-          <a:fontRef idx="minor">
-            <a:schemeClr val="lt1"/>
-          </a:fontRef>
-        </p:style>
-        <p:txBody>
-          <a:bodyPr rtlCol="0" anchor="ctr"/>
-          <a:lstStyle/>
-          <a:p>
-            <a:pPr algn="ctr"/>
-            <a:r>
-              <a:rPr lang="en-US" dirty="0"/>
-              <a:t>Telematics Process</a:t>
-            </a:r>
-            <a:endParaRPr lang="en-IN" dirty="0"/>
-          </a:p>
-        </p:txBody>
-      </p:sp>
-      <p:cxnSp>
-        <p:nvCxnSpPr>
-          <p:cNvPr id="60" name="Connector: Elbow 25">
-            <a:extLst>
-              <a:ext uri="{FF2B5EF4-FFF2-40B4-BE49-F238E27FC236}">
-                <a16:creationId xmlns:a16="http://schemas.microsoft.com/office/drawing/2014/main" id="{A7EC17D8-5918-B896-7125-5F67A3226BF3}"/>
-              </a:ext>
-            </a:extLst>
-          </p:cNvPr>
-          <p:cNvCxnSpPr>
-            <a:cxnSpLocks/>
-            <a:stCxn id="6" idx="3"/>
-            <a:endCxn id="59" idx="2"/>
-          </p:cNvCxnSpPr>
-          <p:nvPr/>
-        </p:nvCxnSpPr>
-        <p:spPr>
-          <a:xfrm flipV="1">
-            <a:off x="4913653" y="916309"/>
-            <a:ext cx="995284" cy="674178"/>
-          </a:xfrm>
-          <a:prstGeom prst="curvedConnector3">
-            <a:avLst>
-              <a:gd name="adj1" fmla="val 50000"/>
-            </a:avLst>
-          </a:prstGeom>
-          <a:ln>
-            <a:headEnd type="triangle"/>
-            <a:tailEnd type="triangle"/>
-          </a:ln>
-        </p:spPr>
-        <p:style>
-          <a:lnRef idx="2">
-            <a:schemeClr val="accent1"/>
-          </a:lnRef>
-          <a:fillRef idx="0">
-            <a:schemeClr val="accent1"/>
-          </a:fillRef>
-          <a:effectRef idx="1">
-            <a:schemeClr val="accent1"/>
-          </a:effectRef>
-          <a:fontRef idx="minor">
-            <a:schemeClr val="tx1"/>
-          </a:fontRef>
-        </p:style>
-      </p:cxnSp>
-      <p:cxnSp>
-        <p:nvCxnSpPr>
-          <p:cNvPr id="72" name="Connector: Elbow 25">
-            <a:extLst>
-              <a:ext uri="{FF2B5EF4-FFF2-40B4-BE49-F238E27FC236}">
-                <a16:creationId xmlns:a16="http://schemas.microsoft.com/office/drawing/2014/main" id="{A9A68B27-B6A7-7F97-2E5F-0C5254256808}"/>
-              </a:ext>
-            </a:extLst>
-          </p:cNvPr>
-          <p:cNvCxnSpPr>
-            <a:cxnSpLocks/>
-            <a:stCxn id="12" idx="6"/>
-            <a:endCxn id="11" idx="1"/>
-          </p:cNvCxnSpPr>
-          <p:nvPr/>
-        </p:nvCxnSpPr>
-        <p:spPr>
-          <a:xfrm>
-            <a:off x="8112491" y="2995815"/>
-            <a:ext cx="2019921" cy="542324"/>
-          </a:xfrm>
-          <a:prstGeom prst="curvedConnector3">
-            <a:avLst>
-              <a:gd name="adj1" fmla="val 50000"/>
-            </a:avLst>
-          </a:prstGeom>
-          <a:ln>
-            <a:headEnd type="triangle"/>
-            <a:tailEnd type="triangle"/>
-          </a:ln>
-        </p:spPr>
-        <p:style>
-          <a:lnRef idx="2">
-            <a:schemeClr val="accent1"/>
-          </a:lnRef>
-          <a:fillRef idx="0">
-            <a:schemeClr val="accent1"/>
-          </a:fillRef>
-          <a:effectRef idx="1">
-            <a:schemeClr val="accent1"/>
-          </a:effectRef>
-          <a:fontRef idx="minor">
-            <a:schemeClr val="tx1"/>
-          </a:fontRef>
-        </p:style>
-      </p:cxnSp>
-      <p:cxnSp>
-        <p:nvCxnSpPr>
-          <p:cNvPr id="75" name="Connector: Elbow 25">
-            <a:extLst>
-              <a:ext uri="{FF2B5EF4-FFF2-40B4-BE49-F238E27FC236}">
-                <a16:creationId xmlns:a16="http://schemas.microsoft.com/office/drawing/2014/main" id="{A633D5A5-FE64-0471-C58E-9BD7E098B661}"/>
-              </a:ext>
-            </a:extLst>
-          </p:cNvPr>
-          <p:cNvCxnSpPr>
-            <a:cxnSpLocks/>
-            <a:stCxn id="13" idx="6"/>
-            <a:endCxn id="11" idx="1"/>
-          </p:cNvCxnSpPr>
-          <p:nvPr/>
-        </p:nvCxnSpPr>
-        <p:spPr>
-          <a:xfrm flipV="1">
-            <a:off x="8228039" y="3538139"/>
-            <a:ext cx="1904373" cy="2038285"/>
-          </a:xfrm>
-          <a:prstGeom prst="curvedConnector3">
-            <a:avLst>
-              <a:gd name="adj1" fmla="val 50000"/>
-            </a:avLst>
-          </a:prstGeom>
-          <a:ln>
-            <a:headEnd type="triangle"/>
-            <a:tailEnd type="triangle"/>
-          </a:ln>
-        </p:spPr>
-        <p:style>
-          <a:lnRef idx="2">
-            <a:schemeClr val="accent1"/>
-          </a:lnRef>
-          <a:fillRef idx="0">
-            <a:schemeClr val="accent1"/>
-          </a:fillRef>
-          <a:effectRef idx="1">
-            <a:schemeClr val="accent1"/>
-          </a:effectRef>
-          <a:fontRef idx="minor">
-            <a:schemeClr val="tx1"/>
-          </a:fontRef>
-        </p:style>
-      </p:cxnSp>
+        </p:grpSpPr>
+        <p:sp>
+          <p:nvSpPr>
+            <p:cNvPr id="5" name="Rectangle 4">
+              <a:extLst>
+                <a:ext uri="{FF2B5EF4-FFF2-40B4-BE49-F238E27FC236}">
+                  <a16:creationId xmlns:a16="http://schemas.microsoft.com/office/drawing/2014/main" id="{17DE978B-2FF6-6FAB-5969-A87E79AF76FF}"/>
+                </a:ext>
+              </a:extLst>
+            </p:cNvPr>
+            <p:cNvSpPr/>
+            <p:nvPr/>
+          </p:nvSpPr>
+          <p:spPr>
+            <a:xfrm>
+              <a:off x="3820931" y="4486185"/>
+              <a:ext cx="1079291" cy="1663908"/>
+            </a:xfrm>
+            <a:prstGeom prst="rect">
+              <a:avLst/>
+            </a:prstGeom>
+          </p:spPr>
+          <p:style>
+            <a:lnRef idx="2">
+              <a:schemeClr val="accent1">
+                <a:shade val="15000"/>
+              </a:schemeClr>
+            </a:lnRef>
+            <a:fillRef idx="1">
+              <a:schemeClr val="accent1"/>
+            </a:fillRef>
+            <a:effectRef idx="0">
+              <a:schemeClr val="accent1"/>
+            </a:effectRef>
+            <a:fontRef idx="minor">
+              <a:schemeClr val="lt1"/>
+            </a:fontRef>
+          </p:style>
+          <p:txBody>
+            <a:bodyPr rtlCol="0" anchor="ctr"/>
+            <a:lstStyle/>
+            <a:p>
+              <a:pPr algn="ctr"/>
+              <a:r>
+                <a:rPr lang="en-IN" dirty="0"/>
+                <a:t>Driver DB</a:t>
+              </a:r>
+            </a:p>
+          </p:txBody>
+        </p:sp>
+        <p:sp>
+          <p:nvSpPr>
+            <p:cNvPr id="6" name="Rectangle 5">
+              <a:extLst>
+                <a:ext uri="{FF2B5EF4-FFF2-40B4-BE49-F238E27FC236}">
+                  <a16:creationId xmlns:a16="http://schemas.microsoft.com/office/drawing/2014/main" id="{140FE7E0-31BC-1EBD-3007-BEC227D8D23B}"/>
+                </a:ext>
+              </a:extLst>
+            </p:cNvPr>
+            <p:cNvSpPr/>
+            <p:nvPr/>
+          </p:nvSpPr>
+          <p:spPr>
+            <a:xfrm>
+              <a:off x="3834362" y="758533"/>
+              <a:ext cx="1079291" cy="1663908"/>
+            </a:xfrm>
+            <a:prstGeom prst="rect">
+              <a:avLst/>
+            </a:prstGeom>
+          </p:spPr>
+          <p:style>
+            <a:lnRef idx="2">
+              <a:schemeClr val="accent1">
+                <a:shade val="15000"/>
+              </a:schemeClr>
+            </a:lnRef>
+            <a:fillRef idx="1">
+              <a:schemeClr val="accent1"/>
+            </a:fillRef>
+            <a:effectRef idx="0">
+              <a:schemeClr val="accent1"/>
+            </a:effectRef>
+            <a:fontRef idx="minor">
+              <a:schemeClr val="lt1"/>
+            </a:fontRef>
+          </p:style>
+          <p:txBody>
+            <a:bodyPr rtlCol="0" anchor="ctr"/>
+            <a:lstStyle/>
+            <a:p>
+              <a:pPr algn="ctr"/>
+              <a:r>
+                <a:rPr lang="en-IN" dirty="0"/>
+                <a:t>VCU DB</a:t>
+              </a:r>
+            </a:p>
+          </p:txBody>
+        </p:sp>
+        <p:sp>
+          <p:nvSpPr>
+            <p:cNvPr id="7" name="Rectangle 6">
+              <a:extLst>
+                <a:ext uri="{FF2B5EF4-FFF2-40B4-BE49-F238E27FC236}">
+                  <a16:creationId xmlns:a16="http://schemas.microsoft.com/office/drawing/2014/main" id="{2AD84284-143E-F664-0A08-90A43A5D6823}"/>
+                </a:ext>
+              </a:extLst>
+            </p:cNvPr>
+            <p:cNvSpPr/>
+            <p:nvPr/>
+          </p:nvSpPr>
+          <p:spPr>
+            <a:xfrm>
+              <a:off x="3820931" y="2546110"/>
+              <a:ext cx="1079291" cy="1663908"/>
+            </a:xfrm>
+            <a:prstGeom prst="rect">
+              <a:avLst/>
+            </a:prstGeom>
+          </p:spPr>
+          <p:style>
+            <a:lnRef idx="2">
+              <a:schemeClr val="accent1">
+                <a:shade val="15000"/>
+              </a:schemeClr>
+            </a:lnRef>
+            <a:fillRef idx="1">
+              <a:schemeClr val="accent1"/>
+            </a:fillRef>
+            <a:effectRef idx="0">
+              <a:schemeClr val="accent1"/>
+            </a:effectRef>
+            <a:fontRef idx="minor">
+              <a:schemeClr val="lt1"/>
+            </a:fontRef>
+          </p:style>
+          <p:txBody>
+            <a:bodyPr rtlCol="0" anchor="ctr"/>
+            <a:lstStyle/>
+            <a:p>
+              <a:pPr algn="ctr"/>
+              <a:r>
+                <a:rPr lang="en-IN" dirty="0"/>
+                <a:t>BMS DB</a:t>
+              </a:r>
+            </a:p>
+          </p:txBody>
+        </p:sp>
+        <p:sp>
+          <p:nvSpPr>
+            <p:cNvPr id="8" name="Oval 7">
+              <a:extLst>
+                <a:ext uri="{FF2B5EF4-FFF2-40B4-BE49-F238E27FC236}">
+                  <a16:creationId xmlns:a16="http://schemas.microsoft.com/office/drawing/2014/main" id="{49B835A3-A9CE-5FE7-E1E8-C7A7005059E4}"/>
+                </a:ext>
+              </a:extLst>
+            </p:cNvPr>
+            <p:cNvSpPr/>
+            <p:nvPr/>
+          </p:nvSpPr>
+          <p:spPr>
+            <a:xfrm>
+              <a:off x="682057" y="1717033"/>
+              <a:ext cx="2203554" cy="764499"/>
+            </a:xfrm>
+            <a:prstGeom prst="ellipse">
+              <a:avLst/>
+            </a:prstGeom>
+          </p:spPr>
+          <p:style>
+            <a:lnRef idx="2">
+              <a:schemeClr val="accent1">
+                <a:shade val="15000"/>
+              </a:schemeClr>
+            </a:lnRef>
+            <a:fillRef idx="1">
+              <a:schemeClr val="accent1"/>
+            </a:fillRef>
+            <a:effectRef idx="0">
+              <a:schemeClr val="accent1"/>
+            </a:effectRef>
+            <a:fontRef idx="minor">
+              <a:schemeClr val="lt1"/>
+            </a:fontRef>
+          </p:style>
+          <p:txBody>
+            <a:bodyPr rtlCol="0" anchor="ctr"/>
+            <a:lstStyle/>
+            <a:p>
+              <a:pPr algn="ctr"/>
+              <a:r>
+                <a:rPr lang="en-US" dirty="0"/>
+                <a:t>CAN Comm Process</a:t>
+              </a:r>
+              <a:endParaRPr lang="en-IN" dirty="0"/>
+            </a:p>
+          </p:txBody>
+        </p:sp>
+        <p:sp>
+          <p:nvSpPr>
+            <p:cNvPr id="9" name="Oval 8">
+              <a:extLst>
+                <a:ext uri="{FF2B5EF4-FFF2-40B4-BE49-F238E27FC236}">
+                  <a16:creationId xmlns:a16="http://schemas.microsoft.com/office/drawing/2014/main" id="{12EA51DD-BA04-74BA-D1DD-21EA3A7455B8}"/>
+                </a:ext>
+              </a:extLst>
+            </p:cNvPr>
+            <p:cNvSpPr/>
+            <p:nvPr/>
+          </p:nvSpPr>
+          <p:spPr>
+            <a:xfrm>
+              <a:off x="682057" y="2866231"/>
+              <a:ext cx="2203554" cy="764499"/>
+            </a:xfrm>
+            <a:prstGeom prst="ellipse">
+              <a:avLst/>
+            </a:prstGeom>
+          </p:spPr>
+          <p:style>
+            <a:lnRef idx="2">
+              <a:schemeClr val="accent1">
+                <a:shade val="15000"/>
+              </a:schemeClr>
+            </a:lnRef>
+            <a:fillRef idx="1">
+              <a:schemeClr val="accent1"/>
+            </a:fillRef>
+            <a:effectRef idx="0">
+              <a:schemeClr val="accent1"/>
+            </a:effectRef>
+            <a:fontRef idx="minor">
+              <a:schemeClr val="lt1"/>
+            </a:fontRef>
+          </p:style>
+          <p:txBody>
+            <a:bodyPr rtlCol="0" anchor="ctr"/>
+            <a:lstStyle/>
+            <a:p>
+              <a:pPr algn="ctr"/>
+              <a:r>
+                <a:rPr lang="en-US" dirty="0"/>
+                <a:t>UART Comm Process</a:t>
+              </a:r>
+              <a:endParaRPr lang="en-IN" dirty="0"/>
+            </a:p>
+          </p:txBody>
+        </p:sp>
+        <p:sp>
+          <p:nvSpPr>
+            <p:cNvPr id="10" name="Oval 9">
+              <a:extLst>
+                <a:ext uri="{FF2B5EF4-FFF2-40B4-BE49-F238E27FC236}">
+                  <a16:creationId xmlns:a16="http://schemas.microsoft.com/office/drawing/2014/main" id="{97C9424B-08DD-033E-05C4-4769FB0065CB}"/>
+                </a:ext>
+              </a:extLst>
+            </p:cNvPr>
+            <p:cNvSpPr/>
+            <p:nvPr/>
+          </p:nvSpPr>
+          <p:spPr>
+            <a:xfrm>
+              <a:off x="9570281" y="1270131"/>
+              <a:ext cx="2203554" cy="764499"/>
+            </a:xfrm>
+            <a:prstGeom prst="ellipse">
+              <a:avLst/>
+            </a:prstGeom>
+          </p:spPr>
+          <p:style>
+            <a:lnRef idx="2">
+              <a:schemeClr val="accent1">
+                <a:shade val="15000"/>
+              </a:schemeClr>
+            </a:lnRef>
+            <a:fillRef idx="1">
+              <a:schemeClr val="accent1"/>
+            </a:fillRef>
+            <a:effectRef idx="0">
+              <a:schemeClr val="accent1"/>
+            </a:effectRef>
+            <a:fontRef idx="minor">
+              <a:schemeClr val="lt1"/>
+            </a:fontRef>
+          </p:style>
+          <p:txBody>
+            <a:bodyPr rtlCol="0" anchor="ctr"/>
+            <a:lstStyle/>
+            <a:p>
+              <a:pPr algn="ctr"/>
+              <a:r>
+                <a:rPr lang="en-US" dirty="0"/>
+                <a:t>SPI Comm Process</a:t>
+              </a:r>
+              <a:endParaRPr lang="en-IN" dirty="0"/>
+            </a:p>
+          </p:txBody>
+        </p:sp>
+        <p:sp>
+          <p:nvSpPr>
+            <p:cNvPr id="11" name="Rectangle 10">
+              <a:extLst>
+                <a:ext uri="{FF2B5EF4-FFF2-40B4-BE49-F238E27FC236}">
+                  <a16:creationId xmlns:a16="http://schemas.microsoft.com/office/drawing/2014/main" id="{7AFAE1D3-370F-D644-A195-42E917662D1C}"/>
+                </a:ext>
+              </a:extLst>
+            </p:cNvPr>
+            <p:cNvSpPr/>
+            <p:nvPr/>
+          </p:nvSpPr>
+          <p:spPr>
+            <a:xfrm>
+              <a:off x="10132412" y="2513681"/>
+              <a:ext cx="1079291" cy="1663908"/>
+            </a:xfrm>
+            <a:prstGeom prst="rect">
+              <a:avLst/>
+            </a:prstGeom>
+          </p:spPr>
+          <p:style>
+            <a:lnRef idx="2">
+              <a:schemeClr val="accent1">
+                <a:shade val="15000"/>
+              </a:schemeClr>
+            </a:lnRef>
+            <a:fillRef idx="1">
+              <a:schemeClr val="accent1"/>
+            </a:fillRef>
+            <a:effectRef idx="0">
+              <a:schemeClr val="accent1"/>
+            </a:effectRef>
+            <a:fontRef idx="minor">
+              <a:schemeClr val="lt1"/>
+            </a:fontRef>
+          </p:style>
+          <p:txBody>
+            <a:bodyPr rtlCol="0" anchor="ctr"/>
+            <a:lstStyle/>
+            <a:p>
+              <a:pPr algn="ctr"/>
+              <a:r>
+                <a:rPr lang="en-IN" dirty="0" err="1"/>
+                <a:t>SFlash</a:t>
+              </a:r>
+              <a:endParaRPr lang="en-IN" dirty="0"/>
+            </a:p>
+          </p:txBody>
+        </p:sp>
+        <p:sp>
+          <p:nvSpPr>
+            <p:cNvPr id="12" name="Oval 11">
+              <a:extLst>
+                <a:ext uri="{FF2B5EF4-FFF2-40B4-BE49-F238E27FC236}">
+                  <a16:creationId xmlns:a16="http://schemas.microsoft.com/office/drawing/2014/main" id="{F93F0EAE-BB67-99CE-3735-669CF15F89D0}"/>
+                </a:ext>
+              </a:extLst>
+            </p:cNvPr>
+            <p:cNvSpPr/>
+            <p:nvPr/>
+          </p:nvSpPr>
+          <p:spPr>
+            <a:xfrm>
+              <a:off x="5908937" y="2966489"/>
+              <a:ext cx="2203554" cy="764499"/>
+            </a:xfrm>
+            <a:prstGeom prst="ellipse">
+              <a:avLst/>
+            </a:prstGeom>
+          </p:spPr>
+          <p:style>
+            <a:lnRef idx="2">
+              <a:schemeClr val="accent1">
+                <a:shade val="15000"/>
+              </a:schemeClr>
+            </a:lnRef>
+            <a:fillRef idx="1">
+              <a:schemeClr val="accent1"/>
+            </a:fillRef>
+            <a:effectRef idx="0">
+              <a:schemeClr val="accent1"/>
+            </a:effectRef>
+            <a:fontRef idx="minor">
+              <a:schemeClr val="lt1"/>
+            </a:fontRef>
+          </p:style>
+          <p:txBody>
+            <a:bodyPr rtlCol="0" anchor="ctr"/>
+            <a:lstStyle/>
+            <a:p>
+              <a:pPr algn="ctr"/>
+              <a:r>
+                <a:rPr lang="en-US" dirty="0"/>
+                <a:t>VCU Process</a:t>
+              </a:r>
+              <a:endParaRPr lang="en-IN" dirty="0"/>
+            </a:p>
+          </p:txBody>
+        </p:sp>
+        <p:sp>
+          <p:nvSpPr>
+            <p:cNvPr id="13" name="Oval 12">
+              <a:extLst>
+                <a:ext uri="{FF2B5EF4-FFF2-40B4-BE49-F238E27FC236}">
+                  <a16:creationId xmlns:a16="http://schemas.microsoft.com/office/drawing/2014/main" id="{F03EE054-80C2-E45B-F6F8-DF5A2F03E50C}"/>
+                </a:ext>
+              </a:extLst>
+            </p:cNvPr>
+            <p:cNvSpPr/>
+            <p:nvPr/>
+          </p:nvSpPr>
+          <p:spPr>
+            <a:xfrm>
+              <a:off x="6024485" y="5194174"/>
+              <a:ext cx="2203554" cy="764499"/>
+            </a:xfrm>
+            <a:prstGeom prst="ellipse">
+              <a:avLst/>
+            </a:prstGeom>
+          </p:spPr>
+          <p:style>
+            <a:lnRef idx="2">
+              <a:schemeClr val="accent1">
+                <a:shade val="15000"/>
+              </a:schemeClr>
+            </a:lnRef>
+            <a:fillRef idx="1">
+              <a:schemeClr val="accent1"/>
+            </a:fillRef>
+            <a:effectRef idx="0">
+              <a:schemeClr val="accent1"/>
+            </a:effectRef>
+            <a:fontRef idx="minor">
+              <a:schemeClr val="lt1"/>
+            </a:fontRef>
+          </p:style>
+          <p:txBody>
+            <a:bodyPr rtlCol="0" anchor="ctr"/>
+            <a:lstStyle/>
+            <a:p>
+              <a:pPr algn="ctr"/>
+              <a:r>
+                <a:rPr lang="en-US" dirty="0"/>
+                <a:t>BMS Process</a:t>
+              </a:r>
+              <a:endParaRPr lang="en-IN" dirty="0"/>
+            </a:p>
+          </p:txBody>
+        </p:sp>
+        <p:sp>
+          <p:nvSpPr>
+            <p:cNvPr id="14" name="Oval 13">
+              <a:extLst>
+                <a:ext uri="{FF2B5EF4-FFF2-40B4-BE49-F238E27FC236}">
+                  <a16:creationId xmlns:a16="http://schemas.microsoft.com/office/drawing/2014/main" id="{3ED63028-9EF1-0365-7FF3-20A5928C6B90}"/>
+                </a:ext>
+              </a:extLst>
+            </p:cNvPr>
+            <p:cNvSpPr/>
+            <p:nvPr/>
+          </p:nvSpPr>
+          <p:spPr>
+            <a:xfrm>
+              <a:off x="682057" y="3915112"/>
+              <a:ext cx="2203554" cy="764499"/>
+            </a:xfrm>
+            <a:prstGeom prst="ellipse">
+              <a:avLst/>
+            </a:prstGeom>
+          </p:spPr>
+          <p:style>
+            <a:lnRef idx="2">
+              <a:schemeClr val="accent1">
+                <a:shade val="15000"/>
+              </a:schemeClr>
+            </a:lnRef>
+            <a:fillRef idx="1">
+              <a:schemeClr val="accent1"/>
+            </a:fillRef>
+            <a:effectRef idx="0">
+              <a:schemeClr val="accent1"/>
+            </a:effectRef>
+            <a:fontRef idx="minor">
+              <a:schemeClr val="lt1"/>
+            </a:fontRef>
+          </p:style>
+          <p:txBody>
+            <a:bodyPr rtlCol="0" anchor="ctr"/>
+            <a:lstStyle/>
+            <a:p>
+              <a:pPr algn="ctr"/>
+              <a:r>
+                <a:rPr lang="en-US" dirty="0"/>
+                <a:t>Analog Process</a:t>
+              </a:r>
+              <a:endParaRPr lang="en-IN" dirty="0"/>
+            </a:p>
+          </p:txBody>
+        </p:sp>
+        <p:sp>
+          <p:nvSpPr>
+            <p:cNvPr id="15" name="Oval 14">
+              <a:extLst>
+                <a:ext uri="{FF2B5EF4-FFF2-40B4-BE49-F238E27FC236}">
+                  <a16:creationId xmlns:a16="http://schemas.microsoft.com/office/drawing/2014/main" id="{BB04F515-193D-A9A8-D097-0444C8F1BE29}"/>
+                </a:ext>
+              </a:extLst>
+            </p:cNvPr>
+            <p:cNvSpPr/>
+            <p:nvPr/>
+          </p:nvSpPr>
+          <p:spPr>
+            <a:xfrm>
+              <a:off x="682057" y="4870735"/>
+              <a:ext cx="2203554" cy="764499"/>
+            </a:xfrm>
+            <a:prstGeom prst="ellipse">
+              <a:avLst/>
+            </a:prstGeom>
+          </p:spPr>
+          <p:style>
+            <a:lnRef idx="2">
+              <a:schemeClr val="accent1">
+                <a:shade val="15000"/>
+              </a:schemeClr>
+            </a:lnRef>
+            <a:fillRef idx="1">
+              <a:schemeClr val="accent1"/>
+            </a:fillRef>
+            <a:effectRef idx="0">
+              <a:schemeClr val="accent1"/>
+            </a:effectRef>
+            <a:fontRef idx="minor">
+              <a:schemeClr val="lt1"/>
+            </a:fontRef>
+          </p:style>
+          <p:txBody>
+            <a:bodyPr rtlCol="0" anchor="ctr"/>
+            <a:lstStyle/>
+            <a:p>
+              <a:pPr algn="ctr"/>
+              <a:r>
+                <a:rPr lang="en-US" dirty="0"/>
+                <a:t>GPIO Process</a:t>
+              </a:r>
+              <a:endParaRPr lang="en-IN" dirty="0"/>
+            </a:p>
+          </p:txBody>
+        </p:sp>
+        <p:sp>
+          <p:nvSpPr>
+            <p:cNvPr id="16" name="Oval 15">
+              <a:extLst>
+                <a:ext uri="{FF2B5EF4-FFF2-40B4-BE49-F238E27FC236}">
+                  <a16:creationId xmlns:a16="http://schemas.microsoft.com/office/drawing/2014/main" id="{B33FA15C-3317-D850-22CC-A9D1BC7F9889}"/>
+                </a:ext>
+              </a:extLst>
+            </p:cNvPr>
+            <p:cNvSpPr/>
+            <p:nvPr/>
+          </p:nvSpPr>
+          <p:spPr>
+            <a:xfrm>
+              <a:off x="682057" y="5826358"/>
+              <a:ext cx="2203554" cy="764499"/>
+            </a:xfrm>
+            <a:prstGeom prst="ellipse">
+              <a:avLst/>
+            </a:prstGeom>
+          </p:spPr>
+          <p:style>
+            <a:lnRef idx="2">
+              <a:schemeClr val="accent1">
+                <a:shade val="15000"/>
+              </a:schemeClr>
+            </a:lnRef>
+            <a:fillRef idx="1">
+              <a:schemeClr val="accent1"/>
+            </a:fillRef>
+            <a:effectRef idx="0">
+              <a:schemeClr val="accent1"/>
+            </a:effectRef>
+            <a:fontRef idx="minor">
+              <a:schemeClr val="lt1"/>
+            </a:fontRef>
+          </p:style>
+          <p:txBody>
+            <a:bodyPr rtlCol="0" anchor="ctr"/>
+            <a:lstStyle/>
+            <a:p>
+              <a:pPr algn="ctr"/>
+              <a:r>
+                <a:rPr lang="en-US" dirty="0"/>
+                <a:t>PWM &amp; </a:t>
+              </a:r>
+              <a:r>
+                <a:rPr lang="en-US" dirty="0" err="1"/>
+                <a:t>FrqIn</a:t>
+              </a:r>
+              <a:r>
+                <a:rPr lang="en-US" dirty="0"/>
+                <a:t> Process</a:t>
+              </a:r>
+              <a:endParaRPr lang="en-IN" dirty="0"/>
+            </a:p>
+          </p:txBody>
+        </p:sp>
+        <p:cxnSp>
+          <p:nvCxnSpPr>
+            <p:cNvPr id="17" name="Connector: Elbow 25">
+              <a:extLst>
+                <a:ext uri="{FF2B5EF4-FFF2-40B4-BE49-F238E27FC236}">
+                  <a16:creationId xmlns:a16="http://schemas.microsoft.com/office/drawing/2014/main" id="{5EE0F36F-6F6C-5953-885B-626F2869C56D}"/>
+                </a:ext>
+              </a:extLst>
+            </p:cNvPr>
+            <p:cNvCxnSpPr>
+              <a:cxnSpLocks/>
+              <a:stCxn id="8" idx="6"/>
+              <a:endCxn id="6" idx="1"/>
+            </p:cNvCxnSpPr>
+            <p:nvPr/>
+          </p:nvCxnSpPr>
+          <p:spPr>
+            <a:xfrm flipV="1">
+              <a:off x="2885611" y="1590487"/>
+              <a:ext cx="948751" cy="508796"/>
+            </a:xfrm>
+            <a:prstGeom prst="curvedConnector3">
+              <a:avLst>
+                <a:gd name="adj1" fmla="val 50000"/>
+              </a:avLst>
+            </a:prstGeom>
+            <a:ln>
+              <a:headEnd type="triangle"/>
+              <a:tailEnd type="triangle"/>
+            </a:ln>
+          </p:spPr>
+          <p:style>
+            <a:lnRef idx="2">
+              <a:schemeClr val="accent1"/>
+            </a:lnRef>
+            <a:fillRef idx="0">
+              <a:schemeClr val="accent1"/>
+            </a:fillRef>
+            <a:effectRef idx="1">
+              <a:schemeClr val="accent1"/>
+            </a:effectRef>
+            <a:fontRef idx="minor">
+              <a:schemeClr val="tx1"/>
+            </a:fontRef>
+          </p:style>
+        </p:cxnSp>
+        <p:cxnSp>
+          <p:nvCxnSpPr>
+            <p:cNvPr id="21" name="Connector: Elbow 25">
+              <a:extLst>
+                <a:ext uri="{FF2B5EF4-FFF2-40B4-BE49-F238E27FC236}">
+                  <a16:creationId xmlns:a16="http://schemas.microsoft.com/office/drawing/2014/main" id="{C0A8C820-E182-90E7-C4C4-131036468F12}"/>
+                </a:ext>
+              </a:extLst>
+            </p:cNvPr>
+            <p:cNvCxnSpPr>
+              <a:cxnSpLocks/>
+              <a:stCxn id="9" idx="6"/>
+              <a:endCxn id="7" idx="1"/>
+            </p:cNvCxnSpPr>
+            <p:nvPr/>
+          </p:nvCxnSpPr>
+          <p:spPr>
+            <a:xfrm>
+              <a:off x="2885611" y="3248481"/>
+              <a:ext cx="935320" cy="129583"/>
+            </a:xfrm>
+            <a:prstGeom prst="curvedConnector3">
+              <a:avLst>
+                <a:gd name="adj1" fmla="val 50000"/>
+              </a:avLst>
+            </a:prstGeom>
+            <a:ln>
+              <a:headEnd type="triangle"/>
+              <a:tailEnd type="triangle"/>
+            </a:ln>
+          </p:spPr>
+          <p:style>
+            <a:lnRef idx="2">
+              <a:schemeClr val="accent1"/>
+            </a:lnRef>
+            <a:fillRef idx="0">
+              <a:schemeClr val="accent1"/>
+            </a:fillRef>
+            <a:effectRef idx="1">
+              <a:schemeClr val="accent1"/>
+            </a:effectRef>
+            <a:fontRef idx="minor">
+              <a:schemeClr val="tx1"/>
+            </a:fontRef>
+          </p:style>
+        </p:cxnSp>
+        <p:cxnSp>
+          <p:nvCxnSpPr>
+            <p:cNvPr id="29" name="Connector: Elbow 25">
+              <a:extLst>
+                <a:ext uri="{FF2B5EF4-FFF2-40B4-BE49-F238E27FC236}">
+                  <a16:creationId xmlns:a16="http://schemas.microsoft.com/office/drawing/2014/main" id="{88F53EF5-ABDA-D854-0B87-A01827AD5E0A}"/>
+                </a:ext>
+              </a:extLst>
+            </p:cNvPr>
+            <p:cNvCxnSpPr>
+              <a:cxnSpLocks/>
+              <a:stCxn id="8" idx="6"/>
+              <a:endCxn id="7" idx="1"/>
+            </p:cNvCxnSpPr>
+            <p:nvPr/>
+          </p:nvCxnSpPr>
+          <p:spPr>
+            <a:xfrm>
+              <a:off x="2885611" y="2099283"/>
+              <a:ext cx="935320" cy="1278781"/>
+            </a:xfrm>
+            <a:prstGeom prst="curvedConnector3">
+              <a:avLst>
+                <a:gd name="adj1" fmla="val 50000"/>
+              </a:avLst>
+            </a:prstGeom>
+            <a:ln>
+              <a:headEnd type="triangle"/>
+              <a:tailEnd type="triangle"/>
+            </a:ln>
+          </p:spPr>
+          <p:style>
+            <a:lnRef idx="2">
+              <a:schemeClr val="accent1"/>
+            </a:lnRef>
+            <a:fillRef idx="0">
+              <a:schemeClr val="accent1"/>
+            </a:fillRef>
+            <a:effectRef idx="1">
+              <a:schemeClr val="accent1"/>
+            </a:effectRef>
+            <a:fontRef idx="minor">
+              <a:schemeClr val="tx1"/>
+            </a:fontRef>
+          </p:style>
+        </p:cxnSp>
+        <p:cxnSp>
+          <p:nvCxnSpPr>
+            <p:cNvPr id="32" name="Connector: Elbow 25">
+              <a:extLst>
+                <a:ext uri="{FF2B5EF4-FFF2-40B4-BE49-F238E27FC236}">
+                  <a16:creationId xmlns:a16="http://schemas.microsoft.com/office/drawing/2014/main" id="{339C47A0-076D-42C7-16B7-D1E755213C22}"/>
+                </a:ext>
+              </a:extLst>
+            </p:cNvPr>
+            <p:cNvCxnSpPr>
+              <a:cxnSpLocks/>
+              <a:stCxn id="14" idx="6"/>
+              <a:endCxn id="5" idx="1"/>
+            </p:cNvCxnSpPr>
+            <p:nvPr/>
+          </p:nvCxnSpPr>
+          <p:spPr>
+            <a:xfrm>
+              <a:off x="2885611" y="4297362"/>
+              <a:ext cx="935320" cy="1020777"/>
+            </a:xfrm>
+            <a:prstGeom prst="curvedConnector3">
+              <a:avLst>
+                <a:gd name="adj1" fmla="val 50000"/>
+              </a:avLst>
+            </a:prstGeom>
+            <a:ln>
+              <a:headEnd type="triangle"/>
+              <a:tailEnd type="triangle"/>
+            </a:ln>
+          </p:spPr>
+          <p:style>
+            <a:lnRef idx="2">
+              <a:schemeClr val="accent1"/>
+            </a:lnRef>
+            <a:fillRef idx="0">
+              <a:schemeClr val="accent1"/>
+            </a:fillRef>
+            <a:effectRef idx="1">
+              <a:schemeClr val="accent1"/>
+            </a:effectRef>
+            <a:fontRef idx="minor">
+              <a:schemeClr val="tx1"/>
+            </a:fontRef>
+          </p:style>
+        </p:cxnSp>
+        <p:cxnSp>
+          <p:nvCxnSpPr>
+            <p:cNvPr id="35" name="Connector: Elbow 25">
+              <a:extLst>
+                <a:ext uri="{FF2B5EF4-FFF2-40B4-BE49-F238E27FC236}">
+                  <a16:creationId xmlns:a16="http://schemas.microsoft.com/office/drawing/2014/main" id="{D8D5F878-1BC6-CC98-39FD-896A32034898}"/>
+                </a:ext>
+              </a:extLst>
+            </p:cNvPr>
+            <p:cNvCxnSpPr>
+              <a:cxnSpLocks/>
+              <a:stCxn id="16" idx="6"/>
+              <a:endCxn id="5" idx="1"/>
+            </p:cNvCxnSpPr>
+            <p:nvPr/>
+          </p:nvCxnSpPr>
+          <p:spPr>
+            <a:xfrm flipV="1">
+              <a:off x="2885611" y="5318139"/>
+              <a:ext cx="935320" cy="890469"/>
+            </a:xfrm>
+            <a:prstGeom prst="curvedConnector3">
+              <a:avLst>
+                <a:gd name="adj1" fmla="val 50000"/>
+              </a:avLst>
+            </a:prstGeom>
+            <a:ln>
+              <a:headEnd type="triangle"/>
+              <a:tailEnd type="triangle"/>
+            </a:ln>
+          </p:spPr>
+          <p:style>
+            <a:lnRef idx="2">
+              <a:schemeClr val="accent1"/>
+            </a:lnRef>
+            <a:fillRef idx="0">
+              <a:schemeClr val="accent1"/>
+            </a:fillRef>
+            <a:effectRef idx="1">
+              <a:schemeClr val="accent1"/>
+            </a:effectRef>
+            <a:fontRef idx="minor">
+              <a:schemeClr val="tx1"/>
+            </a:fontRef>
+          </p:style>
+        </p:cxnSp>
+        <p:cxnSp>
+          <p:nvCxnSpPr>
+            <p:cNvPr id="38" name="Connector: Elbow 25">
+              <a:extLst>
+                <a:ext uri="{FF2B5EF4-FFF2-40B4-BE49-F238E27FC236}">
+                  <a16:creationId xmlns:a16="http://schemas.microsoft.com/office/drawing/2014/main" id="{0C7A13AC-B458-290D-E2B6-0523CE651504}"/>
+                </a:ext>
+              </a:extLst>
+            </p:cNvPr>
+            <p:cNvCxnSpPr>
+              <a:cxnSpLocks/>
+              <a:stCxn id="15" idx="6"/>
+              <a:endCxn id="5" idx="1"/>
+            </p:cNvCxnSpPr>
+            <p:nvPr/>
+          </p:nvCxnSpPr>
+          <p:spPr>
+            <a:xfrm>
+              <a:off x="2885611" y="5252985"/>
+              <a:ext cx="935320" cy="65154"/>
+            </a:xfrm>
+            <a:prstGeom prst="curvedConnector3">
+              <a:avLst>
+                <a:gd name="adj1" fmla="val 50000"/>
+              </a:avLst>
+            </a:prstGeom>
+            <a:ln>
+              <a:headEnd type="triangle"/>
+              <a:tailEnd type="triangle"/>
+            </a:ln>
+          </p:spPr>
+          <p:style>
+            <a:lnRef idx="2">
+              <a:schemeClr val="accent1"/>
+            </a:lnRef>
+            <a:fillRef idx="0">
+              <a:schemeClr val="accent1"/>
+            </a:fillRef>
+            <a:effectRef idx="1">
+              <a:schemeClr val="accent1"/>
+            </a:effectRef>
+            <a:fontRef idx="minor">
+              <a:schemeClr val="tx1"/>
+            </a:fontRef>
+          </p:style>
+        </p:cxnSp>
+        <p:cxnSp>
+          <p:nvCxnSpPr>
+            <p:cNvPr id="42" name="Connector: Elbow 25">
+              <a:extLst>
+                <a:ext uri="{FF2B5EF4-FFF2-40B4-BE49-F238E27FC236}">
+                  <a16:creationId xmlns:a16="http://schemas.microsoft.com/office/drawing/2014/main" id="{0A7979BF-C1F3-C8BA-7381-037F85F7A513}"/>
+                </a:ext>
+              </a:extLst>
+            </p:cNvPr>
+            <p:cNvCxnSpPr>
+              <a:cxnSpLocks/>
+              <a:stCxn id="6" idx="3"/>
+              <a:endCxn id="12" idx="0"/>
+            </p:cNvCxnSpPr>
+            <p:nvPr/>
+          </p:nvCxnSpPr>
+          <p:spPr>
+            <a:xfrm>
+              <a:off x="4913653" y="1590487"/>
+              <a:ext cx="2097061" cy="1376002"/>
+            </a:xfrm>
+            <a:prstGeom prst="curvedConnector2">
+              <a:avLst/>
+            </a:prstGeom>
+            <a:ln>
+              <a:headEnd type="triangle"/>
+              <a:tailEnd type="triangle"/>
+            </a:ln>
+          </p:spPr>
+          <p:style>
+            <a:lnRef idx="2">
+              <a:schemeClr val="accent1"/>
+            </a:lnRef>
+            <a:fillRef idx="0">
+              <a:schemeClr val="accent1"/>
+            </a:fillRef>
+            <a:effectRef idx="1">
+              <a:schemeClr val="accent1"/>
+            </a:effectRef>
+            <a:fontRef idx="minor">
+              <a:schemeClr val="tx1"/>
+            </a:fontRef>
+          </p:style>
+        </p:cxnSp>
+        <p:cxnSp>
+          <p:nvCxnSpPr>
+            <p:cNvPr id="45" name="Connector: Elbow 25">
+              <a:extLst>
+                <a:ext uri="{FF2B5EF4-FFF2-40B4-BE49-F238E27FC236}">
+                  <a16:creationId xmlns:a16="http://schemas.microsoft.com/office/drawing/2014/main" id="{A0989D92-D547-440A-AFD0-4D4644126D3E}"/>
+                </a:ext>
+              </a:extLst>
+            </p:cNvPr>
+            <p:cNvCxnSpPr>
+              <a:cxnSpLocks/>
+              <a:stCxn id="5" idx="3"/>
+              <a:endCxn id="12" idx="4"/>
+            </p:cNvCxnSpPr>
+            <p:nvPr/>
+          </p:nvCxnSpPr>
+          <p:spPr>
+            <a:xfrm flipV="1">
+              <a:off x="4900222" y="3730988"/>
+              <a:ext cx="2110492" cy="1587151"/>
+            </a:xfrm>
+            <a:prstGeom prst="curvedConnector2">
+              <a:avLst/>
+            </a:prstGeom>
+            <a:ln>
+              <a:headEnd type="triangle"/>
+              <a:tailEnd type="triangle"/>
+            </a:ln>
+          </p:spPr>
+          <p:style>
+            <a:lnRef idx="2">
+              <a:schemeClr val="accent1"/>
+            </a:lnRef>
+            <a:fillRef idx="0">
+              <a:schemeClr val="accent1"/>
+            </a:fillRef>
+            <a:effectRef idx="1">
+              <a:schemeClr val="accent1"/>
+            </a:effectRef>
+            <a:fontRef idx="minor">
+              <a:schemeClr val="tx1"/>
+            </a:fontRef>
+          </p:style>
+        </p:cxnSp>
+        <p:cxnSp>
+          <p:nvCxnSpPr>
+            <p:cNvPr id="48" name="Connector: Elbow 25">
+              <a:extLst>
+                <a:ext uri="{FF2B5EF4-FFF2-40B4-BE49-F238E27FC236}">
+                  <a16:creationId xmlns:a16="http://schemas.microsoft.com/office/drawing/2014/main" id="{FAA39A3A-7270-4FEE-5EE0-77ACAA0897DF}"/>
+                </a:ext>
+              </a:extLst>
+            </p:cNvPr>
+            <p:cNvCxnSpPr>
+              <a:cxnSpLocks/>
+              <a:stCxn id="7" idx="3"/>
+              <a:endCxn id="13" idx="0"/>
+            </p:cNvCxnSpPr>
+            <p:nvPr/>
+          </p:nvCxnSpPr>
+          <p:spPr>
+            <a:xfrm>
+              <a:off x="4900222" y="3378064"/>
+              <a:ext cx="2226040" cy="1816110"/>
+            </a:xfrm>
+            <a:prstGeom prst="curvedConnector2">
+              <a:avLst/>
+            </a:prstGeom>
+            <a:ln>
+              <a:headEnd type="triangle"/>
+              <a:tailEnd type="triangle"/>
+            </a:ln>
+          </p:spPr>
+          <p:style>
+            <a:lnRef idx="2">
+              <a:schemeClr val="accent1"/>
+            </a:lnRef>
+            <a:fillRef idx="0">
+              <a:schemeClr val="accent1"/>
+            </a:fillRef>
+            <a:effectRef idx="1">
+              <a:schemeClr val="accent1"/>
+            </a:effectRef>
+            <a:fontRef idx="minor">
+              <a:schemeClr val="tx1"/>
+            </a:fontRef>
+          </p:style>
+        </p:cxnSp>
+        <p:cxnSp>
+          <p:nvCxnSpPr>
+            <p:cNvPr id="51" name="Connector: Elbow 25">
+              <a:extLst>
+                <a:ext uri="{FF2B5EF4-FFF2-40B4-BE49-F238E27FC236}">
+                  <a16:creationId xmlns:a16="http://schemas.microsoft.com/office/drawing/2014/main" id="{862D9A01-2E05-27D7-8A81-FAE3D8579BDA}"/>
+                </a:ext>
+              </a:extLst>
+            </p:cNvPr>
+            <p:cNvCxnSpPr>
+              <a:cxnSpLocks/>
+              <a:stCxn id="10" idx="4"/>
+              <a:endCxn id="11" idx="0"/>
+            </p:cNvCxnSpPr>
+            <p:nvPr/>
+          </p:nvCxnSpPr>
+          <p:spPr>
+            <a:xfrm rot="5400000">
+              <a:off x="10432533" y="2274155"/>
+              <a:ext cx="479051" cy="12700"/>
+            </a:xfrm>
+            <a:prstGeom prst="curvedConnector3">
+              <a:avLst>
+                <a:gd name="adj1" fmla="val 50000"/>
+              </a:avLst>
+            </a:prstGeom>
+            <a:ln>
+              <a:headEnd type="triangle"/>
+              <a:tailEnd type="triangle"/>
+            </a:ln>
+          </p:spPr>
+          <p:style>
+            <a:lnRef idx="2">
+              <a:schemeClr val="accent1"/>
+            </a:lnRef>
+            <a:fillRef idx="0">
+              <a:schemeClr val="accent1"/>
+            </a:fillRef>
+            <a:effectRef idx="1">
+              <a:schemeClr val="accent1"/>
+            </a:effectRef>
+            <a:fontRef idx="minor">
+              <a:schemeClr val="tx1"/>
+            </a:fontRef>
+          </p:style>
+        </p:cxnSp>
+        <p:sp>
+          <p:nvSpPr>
+            <p:cNvPr id="59" name="Oval 58">
+              <a:extLst>
+                <a:ext uri="{FF2B5EF4-FFF2-40B4-BE49-F238E27FC236}">
+                  <a16:creationId xmlns:a16="http://schemas.microsoft.com/office/drawing/2014/main" id="{579B0C72-1BD8-3699-6515-DFC4773C4034}"/>
+                </a:ext>
+              </a:extLst>
+            </p:cNvPr>
+            <p:cNvSpPr/>
+            <p:nvPr/>
+          </p:nvSpPr>
+          <p:spPr>
+            <a:xfrm>
+              <a:off x="5908937" y="534059"/>
+              <a:ext cx="2203554" cy="764499"/>
+            </a:xfrm>
+            <a:prstGeom prst="ellipse">
+              <a:avLst/>
+            </a:prstGeom>
+          </p:spPr>
+          <p:style>
+            <a:lnRef idx="2">
+              <a:schemeClr val="accent1">
+                <a:shade val="15000"/>
+              </a:schemeClr>
+            </a:lnRef>
+            <a:fillRef idx="1">
+              <a:schemeClr val="accent1"/>
+            </a:fillRef>
+            <a:effectRef idx="0">
+              <a:schemeClr val="accent1"/>
+            </a:effectRef>
+            <a:fontRef idx="minor">
+              <a:schemeClr val="lt1"/>
+            </a:fontRef>
+          </p:style>
+          <p:txBody>
+            <a:bodyPr rtlCol="0" anchor="ctr"/>
+            <a:lstStyle/>
+            <a:p>
+              <a:pPr algn="ctr"/>
+              <a:r>
+                <a:rPr lang="en-US" dirty="0"/>
+                <a:t>Telematics Process</a:t>
+              </a:r>
+              <a:endParaRPr lang="en-IN" dirty="0"/>
+            </a:p>
+          </p:txBody>
+        </p:sp>
+        <p:cxnSp>
+          <p:nvCxnSpPr>
+            <p:cNvPr id="60" name="Connector: Elbow 25">
+              <a:extLst>
+                <a:ext uri="{FF2B5EF4-FFF2-40B4-BE49-F238E27FC236}">
+                  <a16:creationId xmlns:a16="http://schemas.microsoft.com/office/drawing/2014/main" id="{A7EC17D8-5918-B896-7125-5F67A3226BF3}"/>
+                </a:ext>
+              </a:extLst>
+            </p:cNvPr>
+            <p:cNvCxnSpPr>
+              <a:cxnSpLocks/>
+              <a:stCxn id="6" idx="3"/>
+              <a:endCxn id="59" idx="2"/>
+            </p:cNvCxnSpPr>
+            <p:nvPr/>
+          </p:nvCxnSpPr>
+          <p:spPr>
+            <a:xfrm flipV="1">
+              <a:off x="4913653" y="916309"/>
+              <a:ext cx="995284" cy="674178"/>
+            </a:xfrm>
+            <a:prstGeom prst="curvedConnector3">
+              <a:avLst>
+                <a:gd name="adj1" fmla="val 50000"/>
+              </a:avLst>
+            </a:prstGeom>
+            <a:ln>
+              <a:headEnd type="triangle"/>
+              <a:tailEnd type="triangle"/>
+            </a:ln>
+          </p:spPr>
+          <p:style>
+            <a:lnRef idx="2">
+              <a:schemeClr val="accent1"/>
+            </a:lnRef>
+            <a:fillRef idx="0">
+              <a:schemeClr val="accent1"/>
+            </a:fillRef>
+            <a:effectRef idx="1">
+              <a:schemeClr val="accent1"/>
+            </a:effectRef>
+            <a:fontRef idx="minor">
+              <a:schemeClr val="tx1"/>
+            </a:fontRef>
+          </p:style>
+        </p:cxnSp>
+        <p:cxnSp>
+          <p:nvCxnSpPr>
+            <p:cNvPr id="72" name="Connector: Elbow 25">
+              <a:extLst>
+                <a:ext uri="{FF2B5EF4-FFF2-40B4-BE49-F238E27FC236}">
+                  <a16:creationId xmlns:a16="http://schemas.microsoft.com/office/drawing/2014/main" id="{A9A68B27-B6A7-7F97-2E5F-0C5254256808}"/>
+                </a:ext>
+              </a:extLst>
+            </p:cNvPr>
+            <p:cNvCxnSpPr>
+              <a:cxnSpLocks/>
+              <a:stCxn id="12" idx="6"/>
+              <a:endCxn id="11" idx="1"/>
+            </p:cNvCxnSpPr>
+            <p:nvPr/>
+          </p:nvCxnSpPr>
+          <p:spPr>
+            <a:xfrm flipV="1">
+              <a:off x="8112491" y="3345635"/>
+              <a:ext cx="2019921" cy="3104"/>
+            </a:xfrm>
+            <a:prstGeom prst="curvedConnector3">
+              <a:avLst>
+                <a:gd name="adj1" fmla="val 50000"/>
+              </a:avLst>
+            </a:prstGeom>
+            <a:ln>
+              <a:headEnd type="triangle"/>
+              <a:tailEnd type="triangle"/>
+            </a:ln>
+          </p:spPr>
+          <p:style>
+            <a:lnRef idx="2">
+              <a:schemeClr val="accent1"/>
+            </a:lnRef>
+            <a:fillRef idx="0">
+              <a:schemeClr val="accent1"/>
+            </a:fillRef>
+            <a:effectRef idx="1">
+              <a:schemeClr val="accent1"/>
+            </a:effectRef>
+            <a:fontRef idx="minor">
+              <a:schemeClr val="tx1"/>
+            </a:fontRef>
+          </p:style>
+        </p:cxnSp>
+        <p:cxnSp>
+          <p:nvCxnSpPr>
+            <p:cNvPr id="75" name="Connector: Elbow 25">
+              <a:extLst>
+                <a:ext uri="{FF2B5EF4-FFF2-40B4-BE49-F238E27FC236}">
+                  <a16:creationId xmlns:a16="http://schemas.microsoft.com/office/drawing/2014/main" id="{A633D5A5-FE64-0471-C58E-9BD7E098B661}"/>
+                </a:ext>
+              </a:extLst>
+            </p:cNvPr>
+            <p:cNvCxnSpPr>
+              <a:cxnSpLocks/>
+              <a:stCxn id="13" idx="6"/>
+              <a:endCxn id="11" idx="1"/>
+            </p:cNvCxnSpPr>
+            <p:nvPr/>
+          </p:nvCxnSpPr>
+          <p:spPr>
+            <a:xfrm flipV="1">
+              <a:off x="8228039" y="3345635"/>
+              <a:ext cx="1904373" cy="2230789"/>
+            </a:xfrm>
+            <a:prstGeom prst="curvedConnector3">
+              <a:avLst>
+                <a:gd name="adj1" fmla="val 50000"/>
+              </a:avLst>
+            </a:prstGeom>
+            <a:ln>
+              <a:headEnd type="triangle"/>
+              <a:tailEnd type="triangle"/>
+            </a:ln>
+          </p:spPr>
+          <p:style>
+            <a:lnRef idx="2">
+              <a:schemeClr val="accent1"/>
+            </a:lnRef>
+            <a:fillRef idx="0">
+              <a:schemeClr val="accent1"/>
+            </a:fillRef>
+            <a:effectRef idx="1">
+              <a:schemeClr val="accent1"/>
+            </a:effectRef>
+            <a:fontRef idx="minor">
+              <a:schemeClr val="tx1"/>
+            </a:fontRef>
+          </p:style>
+        </p:cxnSp>
+        <p:cxnSp>
+          <p:nvCxnSpPr>
+            <p:cNvPr id="3" name="Connector: Elbow 25">
+              <a:extLst>
+                <a:ext uri="{FF2B5EF4-FFF2-40B4-BE49-F238E27FC236}">
+                  <a16:creationId xmlns:a16="http://schemas.microsoft.com/office/drawing/2014/main" id="{164FDCF6-9629-62BF-0AA5-68782CEA226C}"/>
+                </a:ext>
+              </a:extLst>
+            </p:cNvPr>
+            <p:cNvCxnSpPr>
+              <a:cxnSpLocks/>
+              <a:stCxn id="7" idx="3"/>
+              <a:endCxn id="12" idx="2"/>
+            </p:cNvCxnSpPr>
+            <p:nvPr/>
+          </p:nvCxnSpPr>
+          <p:spPr>
+            <a:xfrm flipV="1">
+              <a:off x="4900222" y="3348739"/>
+              <a:ext cx="1008715" cy="29325"/>
+            </a:xfrm>
+            <a:prstGeom prst="curvedConnector3">
+              <a:avLst>
+                <a:gd name="adj1" fmla="val 50000"/>
+              </a:avLst>
+            </a:prstGeom>
+            <a:ln>
+              <a:headEnd type="triangle"/>
+              <a:tailEnd type="triangle"/>
+            </a:ln>
+          </p:spPr>
+          <p:style>
+            <a:lnRef idx="2">
+              <a:schemeClr val="accent1"/>
+            </a:lnRef>
+            <a:fillRef idx="0">
+              <a:schemeClr val="accent1"/>
+            </a:fillRef>
+            <a:effectRef idx="1">
+              <a:schemeClr val="accent1"/>
+            </a:effectRef>
+            <a:fontRef idx="minor">
+              <a:schemeClr val="tx1"/>
+            </a:fontRef>
+          </p:style>
+        </p:cxnSp>
+        <p:cxnSp>
+          <p:nvCxnSpPr>
+            <p:cNvPr id="22" name="Connector: Elbow 25">
+              <a:extLst>
+                <a:ext uri="{FF2B5EF4-FFF2-40B4-BE49-F238E27FC236}">
+                  <a16:creationId xmlns:a16="http://schemas.microsoft.com/office/drawing/2014/main" id="{53729333-DF7C-4C62-02FB-C82924819822}"/>
+                </a:ext>
+              </a:extLst>
+            </p:cNvPr>
+            <p:cNvCxnSpPr>
+              <a:cxnSpLocks/>
+              <a:stCxn id="7" idx="3"/>
+              <a:endCxn id="59" idx="3"/>
+            </p:cNvCxnSpPr>
+            <p:nvPr/>
+          </p:nvCxnSpPr>
+          <p:spPr>
+            <a:xfrm flipV="1">
+              <a:off x="4900222" y="1186600"/>
+              <a:ext cx="1331418" cy="2191464"/>
+            </a:xfrm>
+            <a:prstGeom prst="curvedConnector2">
+              <a:avLst/>
+            </a:prstGeom>
+            <a:ln>
+              <a:headEnd type="triangle"/>
+              <a:tailEnd type="triangle"/>
+            </a:ln>
+          </p:spPr>
+          <p:style>
+            <a:lnRef idx="2">
+              <a:schemeClr val="accent1"/>
+            </a:lnRef>
+            <a:fillRef idx="0">
+              <a:schemeClr val="accent1"/>
+            </a:fillRef>
+            <a:effectRef idx="1">
+              <a:schemeClr val="accent1"/>
+            </a:effectRef>
+            <a:fontRef idx="minor">
+              <a:schemeClr val="tx1"/>
+            </a:fontRef>
+          </p:style>
+        </p:cxnSp>
+      </p:grpSp>
     </p:spTree>
     <p:extLst>
       <p:ext uri="{BB962C8B-B14F-4D97-AF65-F5344CB8AC3E}">
@@ -19611,10 +19722,10 @@
       </p:sp>
       <p:grpSp>
         <p:nvGrpSpPr>
-          <p:cNvPr id="82" name="Group 81">
+          <p:cNvPr id="69" name="Group 68">
             <a:extLst>
               <a:ext uri="{FF2B5EF4-FFF2-40B4-BE49-F238E27FC236}">
-                <a16:creationId xmlns:a16="http://schemas.microsoft.com/office/drawing/2014/main" id="{7A5F0ABB-C8BD-FF1E-55A5-522248B4E032}"/>
+                <a16:creationId xmlns:a16="http://schemas.microsoft.com/office/drawing/2014/main" id="{5C12FBBC-4F24-E81B-47C3-190ED1F19E24}"/>
               </a:ext>
             </a:extLst>
           </p:cNvPr>
@@ -19623,10 +19734,10 @@
         </p:nvGrpSpPr>
         <p:grpSpPr>
           <a:xfrm>
-            <a:off x="1782892" y="1048211"/>
-            <a:ext cx="7747427" cy="3310434"/>
-            <a:chOff x="1782892" y="1048211"/>
-            <a:chExt cx="7747427" cy="3310434"/>
+            <a:off x="1086494" y="839606"/>
+            <a:ext cx="9365689" cy="5178788"/>
+            <a:chOff x="1092000" y="631001"/>
+            <a:chExt cx="9365689" cy="5178788"/>
           </a:xfrm>
         </p:grpSpPr>
         <p:sp>
@@ -19643,7 +19754,7 @@
           </p:nvSpPr>
           <p:spPr>
             <a:xfrm>
-              <a:off x="1782892" y="2271406"/>
+              <a:off x="1272293" y="2719900"/>
               <a:ext cx="2203554" cy="764499"/>
             </a:xfrm>
             <a:prstGeom prst="ellipse">
@@ -19691,14 +19802,14 @@
             <p:cNvCxnSpPr>
               <a:cxnSpLocks/>
               <a:stCxn id="7" idx="0"/>
-              <a:endCxn id="50" idx="2"/>
+              <a:endCxn id="54" idx="2"/>
             </p:cNvCxnSpPr>
             <p:nvPr/>
           </p:nvCxnSpPr>
           <p:spPr>
             <a:xfrm rot="5400000" flipH="1" flipV="1">
-              <a:off x="3355643" y="959488"/>
-              <a:ext cx="840945" cy="1782893"/>
+              <a:off x="1776045" y="1611277"/>
+              <a:ext cx="1706649" cy="510599"/>
             </a:xfrm>
             <a:prstGeom prst="curvedConnector2">
               <a:avLst/>
@@ -19736,7 +19847,7 @@
           </p:nvSpPr>
           <p:spPr>
             <a:xfrm>
-              <a:off x="2041394" y="1850933"/>
+              <a:off x="1092000" y="1265258"/>
               <a:ext cx="1001609" cy="430887"/>
             </a:xfrm>
             <a:prstGeom prst="rect">
@@ -19772,7 +19883,7 @@
           </p:nvSpPr>
           <p:spPr>
             <a:xfrm>
-              <a:off x="4667562" y="1048211"/>
+              <a:off x="6370312" y="632346"/>
               <a:ext cx="2203554" cy="764499"/>
             </a:xfrm>
             <a:prstGeom prst="ellipse">
@@ -19822,7 +19933,7 @@
           </p:nvSpPr>
           <p:spPr>
             <a:xfrm>
-              <a:off x="7326765" y="2271406"/>
+              <a:off x="7972894" y="2712787"/>
               <a:ext cx="2203554" cy="764499"/>
             </a:xfrm>
             <a:prstGeom prst="ellipse">
@@ -19872,7 +19983,7 @@
           </p:nvSpPr>
           <p:spPr>
             <a:xfrm>
-              <a:off x="4667562" y="3485188"/>
+              <a:off x="6370312" y="4514020"/>
               <a:ext cx="2203554" cy="764499"/>
             </a:xfrm>
             <a:prstGeom prst="ellipse">
@@ -19902,7 +20013,7 @@
               <a:pPr algn="ctr"/>
               <a:r>
                 <a:rPr lang="en-US" dirty="0"/>
-                <a:t>End Of Charging</a:t>
+                <a:t>Charge Finish</a:t>
               </a:r>
               <a:endParaRPr lang="en-IN" dirty="0"/>
             </a:p>
@@ -19919,14 +20030,15 @@
             </p:cNvPr>
             <p:cNvCxnSpPr>
               <a:cxnSpLocks/>
+              <a:stCxn id="50" idx="6"/>
               <a:endCxn id="51" idx="0"/>
             </p:cNvCxnSpPr>
             <p:nvPr/>
           </p:nvCxnSpPr>
           <p:spPr>
             <a:xfrm>
-              <a:off x="6625652" y="1430460"/>
-              <a:ext cx="1802890" cy="840946"/>
+              <a:off x="8573866" y="1014596"/>
+              <a:ext cx="500805" cy="1698191"/>
             </a:xfrm>
             <a:prstGeom prst="curvedConnector2">
               <a:avLst/>
@@ -19968,8 +20080,8 @@
           </p:nvCxnSpPr>
           <p:spPr>
             <a:xfrm rot="5400000">
-              <a:off x="7234063" y="2672958"/>
-              <a:ext cx="831533" cy="1557426"/>
+              <a:off x="8114777" y="3936376"/>
+              <a:ext cx="1418984" cy="500805"/>
             </a:xfrm>
             <a:prstGeom prst="curvedConnector2">
               <a:avLst/>
@@ -20004,15 +20116,15 @@
             </p:cNvPr>
             <p:cNvCxnSpPr>
               <a:cxnSpLocks/>
-              <a:stCxn id="52" idx="2"/>
+              <a:stCxn id="2" idx="2"/>
               <a:endCxn id="7" idx="4"/>
             </p:cNvCxnSpPr>
             <p:nvPr/>
           </p:nvCxnSpPr>
           <p:spPr>
             <a:xfrm rot="10800000">
-              <a:off x="2884670" y="3035906"/>
-              <a:ext cx="1782893" cy="831533"/>
+              <a:off x="2374070" y="3484399"/>
+              <a:ext cx="500804" cy="1411870"/>
             </a:xfrm>
             <a:prstGeom prst="curvedConnector2">
               <a:avLst/>
@@ -20050,7 +20162,7 @@
           </p:nvSpPr>
           <p:spPr>
             <a:xfrm>
-              <a:off x="7149024" y="1072256"/>
+              <a:off x="9178171" y="1406662"/>
               <a:ext cx="1279518" cy="430887"/>
             </a:xfrm>
             <a:prstGeom prst="rect">
@@ -20098,7 +20210,7 @@
           </p:nvSpPr>
           <p:spPr>
             <a:xfrm>
-              <a:off x="7649829" y="3758481"/>
+              <a:off x="8985801" y="3965182"/>
               <a:ext cx="1279518" cy="600164"/>
             </a:xfrm>
             <a:prstGeom prst="rect">
@@ -20146,7 +20258,7 @@
           </p:nvSpPr>
           <p:spPr>
             <a:xfrm>
-              <a:off x="3275310" y="3867437"/>
+              <a:off x="1372459" y="4033453"/>
               <a:ext cx="1001609" cy="430887"/>
             </a:xfrm>
             <a:prstGeom prst="rect">
@@ -20186,8 +20298,8 @@
           </p:nvCxnSpPr>
           <p:spPr>
             <a:xfrm rot="5400000">
-              <a:off x="4457420" y="1341737"/>
-              <a:ext cx="840946" cy="1782893"/>
+              <a:off x="4621316" y="251376"/>
+              <a:ext cx="1705305" cy="3996242"/>
             </a:xfrm>
             <a:prstGeom prst="curvedConnector2">
               <a:avLst/>
@@ -20228,9 +20340,9 @@
             <p:nvPr/>
           </p:nvCxnSpPr>
           <p:spPr>
-            <a:xfrm rot="10800000">
-              <a:off x="3986447" y="2653656"/>
-              <a:ext cx="3340319" cy="12700"/>
+            <a:xfrm rot="10800000" flipV="1">
+              <a:off x="3475848" y="3095036"/>
+              <a:ext cx="4497047" cy="7113"/>
             </a:xfrm>
             <a:prstGeom prst="curvedConnector3">
               <a:avLst>
@@ -20270,7 +20382,7 @@
           </p:nvSpPr>
           <p:spPr>
             <a:xfrm>
-              <a:off x="5368703" y="2192100"/>
+              <a:off x="5318618" y="2531948"/>
               <a:ext cx="1001609" cy="430887"/>
             </a:xfrm>
             <a:prstGeom prst="rect">
@@ -20292,6 +20404,274 @@
             </a:p>
           </p:txBody>
         </p:sp>
+        <p:sp>
+          <p:nvSpPr>
+            <p:cNvPr id="2" name="Oval 1">
+              <a:extLst>
+                <a:ext uri="{FF2B5EF4-FFF2-40B4-BE49-F238E27FC236}">
+                  <a16:creationId xmlns:a16="http://schemas.microsoft.com/office/drawing/2014/main" id="{35E5DA5A-4DFC-EA49-1C2C-B497D3EFFC62}"/>
+                </a:ext>
+              </a:extLst>
+            </p:cNvPr>
+            <p:cNvSpPr/>
+            <p:nvPr/>
+          </p:nvSpPr>
+          <p:spPr>
+            <a:xfrm>
+              <a:off x="2874874" y="4514019"/>
+              <a:ext cx="2203554" cy="764499"/>
+            </a:xfrm>
+            <a:prstGeom prst="ellipse">
+              <a:avLst/>
+            </a:prstGeom>
+          </p:spPr>
+          <p:style>
+            <a:lnRef idx="2">
+              <a:schemeClr val="accent1">
+                <a:shade val="15000"/>
+              </a:schemeClr>
+            </a:lnRef>
+            <a:fillRef idx="1">
+              <a:schemeClr val="accent1"/>
+            </a:fillRef>
+            <a:effectRef idx="0">
+              <a:schemeClr val="accent1"/>
+            </a:effectRef>
+            <a:fontRef idx="minor">
+              <a:schemeClr val="lt1"/>
+            </a:fontRef>
+          </p:style>
+          <p:txBody>
+            <a:bodyPr rtlCol="0" anchor="ctr"/>
+            <a:lstStyle/>
+            <a:p>
+              <a:pPr algn="ctr"/>
+              <a:r>
+                <a:rPr lang="en-US" dirty="0"/>
+                <a:t>End Of Charging</a:t>
+              </a:r>
+              <a:endParaRPr lang="en-IN" dirty="0"/>
+            </a:p>
+          </p:txBody>
+        </p:sp>
+        <p:cxnSp>
+          <p:nvCxnSpPr>
+            <p:cNvPr id="11" name="Connector: Elbow 25">
+              <a:extLst>
+                <a:ext uri="{FF2B5EF4-FFF2-40B4-BE49-F238E27FC236}">
+                  <a16:creationId xmlns:a16="http://schemas.microsoft.com/office/drawing/2014/main" id="{009071F2-493A-74CB-7BB7-C061B25689B4}"/>
+                </a:ext>
+              </a:extLst>
+            </p:cNvPr>
+            <p:cNvCxnSpPr>
+              <a:cxnSpLocks/>
+              <a:stCxn id="52" idx="2"/>
+              <a:endCxn id="2" idx="6"/>
+            </p:cNvCxnSpPr>
+            <p:nvPr/>
+          </p:nvCxnSpPr>
+          <p:spPr>
+            <a:xfrm rot="10800000">
+              <a:off x="5078428" y="4896270"/>
+              <a:ext cx="1291884" cy="1"/>
+            </a:xfrm>
+            <a:prstGeom prst="curvedConnector3">
+              <a:avLst>
+                <a:gd name="adj1" fmla="val 50000"/>
+              </a:avLst>
+            </a:prstGeom>
+            <a:ln>
+              <a:tailEnd type="triangle"/>
+            </a:ln>
+          </p:spPr>
+          <p:style>
+            <a:lnRef idx="2">
+              <a:schemeClr val="accent1"/>
+            </a:lnRef>
+            <a:fillRef idx="0">
+              <a:schemeClr val="accent1"/>
+            </a:fillRef>
+            <a:effectRef idx="1">
+              <a:schemeClr val="accent1"/>
+            </a:effectRef>
+            <a:fontRef idx="minor">
+              <a:schemeClr val="tx1"/>
+            </a:fontRef>
+          </p:style>
+        </p:cxnSp>
+        <p:sp>
+          <p:nvSpPr>
+            <p:cNvPr id="46" name="TextBox 45">
+              <a:extLst>
+                <a:ext uri="{FF2B5EF4-FFF2-40B4-BE49-F238E27FC236}">
+                  <a16:creationId xmlns:a16="http://schemas.microsoft.com/office/drawing/2014/main" id="{7B23D777-AB48-F2E0-6F03-200B9548E73A}"/>
+                </a:ext>
+              </a:extLst>
+            </p:cNvPr>
+            <p:cNvSpPr txBox="1"/>
+            <p:nvPr/>
+          </p:nvSpPr>
+          <p:spPr>
+            <a:xfrm>
+              <a:off x="5318618" y="5040348"/>
+              <a:ext cx="1001609" cy="769441"/>
+            </a:xfrm>
+            <a:prstGeom prst="rect">
+              <a:avLst/>
+            </a:prstGeom>
+            <a:noFill/>
+          </p:spPr>
+          <p:txBody>
+            <a:bodyPr wrap="square" rtlCol="0">
+              <a:spAutoFit/>
+            </a:bodyPr>
+            <a:lstStyle/>
+            <a:p>
+              <a:r>
+                <a:rPr lang="en-US" sz="1100" dirty="0"/>
+                <a:t>Balancing not needed – cells within x </a:t>
+              </a:r>
+            </a:p>
+            <a:p>
+              <a:r>
+                <a:rPr lang="en-US" sz="1100" dirty="0"/>
+                <a:t>mV</a:t>
+              </a:r>
+              <a:endParaRPr lang="en-IN" sz="1100" dirty="0"/>
+            </a:p>
+          </p:txBody>
+        </p:sp>
+        <p:sp>
+          <p:nvSpPr>
+            <p:cNvPr id="47" name="TextBox 46">
+              <a:extLst>
+                <a:ext uri="{FF2B5EF4-FFF2-40B4-BE49-F238E27FC236}">
+                  <a16:creationId xmlns:a16="http://schemas.microsoft.com/office/drawing/2014/main" id="{6E98FE6F-9AC7-F987-213F-41D9BE71829A}"/>
+                </a:ext>
+              </a:extLst>
+            </p:cNvPr>
+            <p:cNvSpPr txBox="1"/>
+            <p:nvPr/>
+          </p:nvSpPr>
+          <p:spPr>
+            <a:xfrm>
+              <a:off x="5579280" y="3161754"/>
+              <a:ext cx="1001609" cy="430887"/>
+            </a:xfrm>
+            <a:prstGeom prst="rect">
+              <a:avLst/>
+            </a:prstGeom>
+            <a:noFill/>
+          </p:spPr>
+          <p:txBody>
+            <a:bodyPr wrap="square" rtlCol="0">
+              <a:spAutoFit/>
+            </a:bodyPr>
+            <a:lstStyle/>
+            <a:p>
+              <a:r>
+                <a:rPr lang="en-US" sz="1100" dirty="0"/>
+                <a:t>Charger CAN timeout</a:t>
+              </a:r>
+              <a:endParaRPr lang="en-IN" sz="1100" dirty="0"/>
+            </a:p>
+          </p:txBody>
+        </p:sp>
+        <p:sp>
+          <p:nvSpPr>
+            <p:cNvPr id="54" name="Oval 53">
+              <a:extLst>
+                <a:ext uri="{FF2B5EF4-FFF2-40B4-BE49-F238E27FC236}">
+                  <a16:creationId xmlns:a16="http://schemas.microsoft.com/office/drawing/2014/main" id="{DF6D2BFB-1779-69E0-C7DB-A601BB23E4C8}"/>
+                </a:ext>
+              </a:extLst>
+            </p:cNvPr>
+            <p:cNvSpPr/>
+            <p:nvPr/>
+          </p:nvSpPr>
+          <p:spPr>
+            <a:xfrm>
+              <a:off x="2884669" y="631001"/>
+              <a:ext cx="2203554" cy="764499"/>
+            </a:xfrm>
+            <a:prstGeom prst="ellipse">
+              <a:avLst/>
+            </a:prstGeom>
+          </p:spPr>
+          <p:style>
+            <a:lnRef idx="2">
+              <a:schemeClr val="accent1">
+                <a:shade val="15000"/>
+              </a:schemeClr>
+            </a:lnRef>
+            <a:fillRef idx="1">
+              <a:schemeClr val="accent1"/>
+            </a:fillRef>
+            <a:effectRef idx="0">
+              <a:schemeClr val="accent1"/>
+            </a:effectRef>
+            <a:fontRef idx="minor">
+              <a:schemeClr val="lt1"/>
+            </a:fontRef>
+          </p:style>
+          <p:txBody>
+            <a:bodyPr rtlCol="0" anchor="ctr"/>
+            <a:lstStyle/>
+            <a:p>
+              <a:pPr algn="ctr"/>
+              <a:r>
+                <a:rPr lang="en-US" dirty="0"/>
+                <a:t>Current Ramp</a:t>
+              </a:r>
+              <a:endParaRPr lang="en-IN" dirty="0"/>
+            </a:p>
+          </p:txBody>
+        </p:sp>
+        <p:cxnSp>
+          <p:nvCxnSpPr>
+            <p:cNvPr id="63" name="Connector: Elbow 25">
+              <a:extLst>
+                <a:ext uri="{FF2B5EF4-FFF2-40B4-BE49-F238E27FC236}">
+                  <a16:creationId xmlns:a16="http://schemas.microsoft.com/office/drawing/2014/main" id="{C7528FD3-DD28-5A0A-F3B6-2A5F5C93AE8D}"/>
+                </a:ext>
+              </a:extLst>
+            </p:cNvPr>
+            <p:cNvCxnSpPr>
+              <a:cxnSpLocks/>
+              <a:stCxn id="54" idx="6"/>
+              <a:endCxn id="50" idx="2"/>
+            </p:cNvCxnSpPr>
+            <p:nvPr/>
+          </p:nvCxnSpPr>
+          <p:spPr>
+            <a:xfrm>
+              <a:off x="5088223" y="1013251"/>
+              <a:ext cx="1282089" cy="1345"/>
+            </a:xfrm>
+            <a:prstGeom prst="curvedConnector3">
+              <a:avLst>
+                <a:gd name="adj1" fmla="val 50000"/>
+              </a:avLst>
+            </a:prstGeom>
+            <a:ln>
+              <a:tailEnd type="triangle"/>
+            </a:ln>
+          </p:spPr>
+          <p:style>
+            <a:lnRef idx="2">
+              <a:schemeClr val="accent1"/>
+            </a:lnRef>
+            <a:fillRef idx="0">
+              <a:schemeClr val="accent1"/>
+            </a:fillRef>
+            <a:effectRef idx="1">
+              <a:schemeClr val="accent1"/>
+            </a:effectRef>
+            <a:fontRef idx="minor">
+              <a:schemeClr val="tx1"/>
+            </a:fontRef>
+          </p:style>
+        </p:cxnSp>
       </p:grpSp>
     </p:spTree>
     <p:extLst>

</xml_diff>